<commit_message>
Complete overhaul of Class 3
</commit_message>
<xml_diff>
--- a/C1_Introduction/ClassOne.GithubIntro.pptx
+++ b/C1_Introduction/ClassOne.GithubIntro.pptx
@@ -4,21 +4,23 @@
   <p:sldMasterIdLst>
     <p:sldMasterId id="2147483672" r:id="rId1"/>
   </p:sldMasterIdLst>
+  <p:notesMasterIdLst>
+    <p:notesMasterId r:id="rId15"/>
+  </p:notesMasterIdLst>
   <p:sldIdLst>
     <p:sldId id="256" r:id="rId2"/>
-    <p:sldId id="257" r:id="rId3"/>
-    <p:sldId id="258" r:id="rId4"/>
-    <p:sldId id="259" r:id="rId5"/>
-    <p:sldId id="260" r:id="rId6"/>
-    <p:sldId id="261" r:id="rId7"/>
-    <p:sldId id="262" r:id="rId8"/>
-    <p:sldId id="263" r:id="rId9"/>
-    <p:sldId id="265" r:id="rId10"/>
-    <p:sldId id="264" r:id="rId11"/>
-    <p:sldId id="266" r:id="rId12"/>
-    <p:sldId id="267" r:id="rId13"/>
-    <p:sldId id="268" r:id="rId14"/>
-    <p:sldId id="269" r:id="rId15"/>
+    <p:sldId id="271" r:id="rId3"/>
+    <p:sldId id="272" r:id="rId4"/>
+    <p:sldId id="279" r:id="rId5"/>
+    <p:sldId id="273" r:id="rId6"/>
+    <p:sldId id="270" r:id="rId7"/>
+    <p:sldId id="258" r:id="rId8"/>
+    <p:sldId id="276" r:id="rId9"/>
+    <p:sldId id="277" r:id="rId10"/>
+    <p:sldId id="278" r:id="rId11"/>
+    <p:sldId id="262" r:id="rId12"/>
+    <p:sldId id="274" r:id="rId13"/>
+    <p:sldId id="275" r:id="rId14"/>
   </p:sldIdLst>
   <p:sldSz cx="9144000" cy="6858000" type="screen4x3"/>
   <p:notesSz cx="6858000" cy="9144000"/>
@@ -125,6 +127,577 @@
 </p:presentation>
 </file>
 
+<file path=ppt/notesMasters/notesMaster1.xml><?xml version="1.0" encoding="utf-8"?>
+<p:notesMaster xmlns:a="http://schemas.openxmlformats.org/drawingml/2006/main" xmlns:r="http://schemas.openxmlformats.org/officeDocument/2006/relationships" xmlns:p="http://schemas.openxmlformats.org/presentationml/2006/main">
+  <p:cSld>
+    <p:bg>
+      <p:bgRef idx="1001">
+        <a:schemeClr val="bg1"/>
+      </p:bgRef>
+    </p:bg>
+    <p:spTree>
+      <p:nvGrpSpPr>
+        <p:cNvPr id="1" name=""/>
+        <p:cNvGrpSpPr/>
+        <p:nvPr/>
+      </p:nvGrpSpPr>
+      <p:grpSpPr>
+        <a:xfrm>
+          <a:off x="0" y="0"/>
+          <a:ext cx="0" cy="0"/>
+          <a:chOff x="0" y="0"/>
+          <a:chExt cx="0" cy="0"/>
+        </a:xfrm>
+      </p:grpSpPr>
+      <p:sp>
+        <p:nvSpPr>
+          <p:cNvPr id="2" name="Header Placeholder 1"/>
+          <p:cNvSpPr>
+            <a:spLocks noGrp="1"/>
+          </p:cNvSpPr>
+          <p:nvPr>
+            <p:ph type="hdr" sz="quarter"/>
+          </p:nvPr>
+        </p:nvSpPr>
+        <p:spPr>
+          <a:xfrm>
+            <a:off x="0" y="0"/>
+            <a:ext cx="2971800" cy="458788"/>
+          </a:xfrm>
+          <a:prstGeom prst="rect">
+            <a:avLst/>
+          </a:prstGeom>
+        </p:spPr>
+        <p:txBody>
+          <a:bodyPr vert="horz" lIns="91440" tIns="45720" rIns="91440" bIns="45720" rtlCol="0"/>
+          <a:lstStyle>
+            <a:lvl1pPr algn="l">
+              <a:defRPr sz="1200"/>
+            </a:lvl1pPr>
+          </a:lstStyle>
+          <a:p>
+            <a:endParaRPr lang="en-US"/>
+          </a:p>
+        </p:txBody>
+      </p:sp>
+      <p:sp>
+        <p:nvSpPr>
+          <p:cNvPr id="3" name="Date Placeholder 2"/>
+          <p:cNvSpPr>
+            <a:spLocks noGrp="1"/>
+          </p:cNvSpPr>
+          <p:nvPr>
+            <p:ph type="dt" idx="1"/>
+          </p:nvPr>
+        </p:nvSpPr>
+        <p:spPr>
+          <a:xfrm>
+            <a:off x="3884613" y="0"/>
+            <a:ext cx="2971800" cy="458788"/>
+          </a:xfrm>
+          <a:prstGeom prst="rect">
+            <a:avLst/>
+          </a:prstGeom>
+        </p:spPr>
+        <p:txBody>
+          <a:bodyPr vert="horz" lIns="91440" tIns="45720" rIns="91440" bIns="45720" rtlCol="0"/>
+          <a:lstStyle>
+            <a:lvl1pPr algn="r">
+              <a:defRPr sz="1200"/>
+            </a:lvl1pPr>
+          </a:lstStyle>
+          <a:p>
+            <a:fld id="{ED1C625E-B61E-4E59-B385-10C30B8FFFB8}" type="datetimeFigureOut">
+              <a:rPr lang="en-US" smtClean="0"/>
+              <a:t>3/21/2019</a:t>
+            </a:fld>
+            <a:endParaRPr lang="en-US"/>
+          </a:p>
+        </p:txBody>
+      </p:sp>
+      <p:sp>
+        <p:nvSpPr>
+          <p:cNvPr id="4" name="Slide Image Placeholder 3"/>
+          <p:cNvSpPr>
+            <a:spLocks noGrp="1" noRot="1" noChangeAspect="1"/>
+          </p:cNvSpPr>
+          <p:nvPr>
+            <p:ph type="sldImg" idx="2"/>
+          </p:nvPr>
+        </p:nvSpPr>
+        <p:spPr>
+          <a:xfrm>
+            <a:off x="1371600" y="1143000"/>
+            <a:ext cx="4114800" cy="3086100"/>
+          </a:xfrm>
+          <a:prstGeom prst="rect">
+            <a:avLst/>
+          </a:prstGeom>
+          <a:noFill/>
+          <a:ln w="12700">
+            <a:solidFill>
+              <a:prstClr val="black"/>
+            </a:solidFill>
+          </a:ln>
+        </p:spPr>
+        <p:txBody>
+          <a:bodyPr vert="horz" lIns="91440" tIns="45720" rIns="91440" bIns="45720" rtlCol="0" anchor="ctr"/>
+          <a:lstStyle/>
+          <a:p>
+            <a:endParaRPr lang="en-US"/>
+          </a:p>
+        </p:txBody>
+      </p:sp>
+      <p:sp>
+        <p:nvSpPr>
+          <p:cNvPr id="5" name="Notes Placeholder 4"/>
+          <p:cNvSpPr>
+            <a:spLocks noGrp="1"/>
+          </p:cNvSpPr>
+          <p:nvPr>
+            <p:ph type="body" sz="quarter" idx="3"/>
+          </p:nvPr>
+        </p:nvSpPr>
+        <p:spPr>
+          <a:xfrm>
+            <a:off x="685800" y="4400550"/>
+            <a:ext cx="5486400" cy="3600450"/>
+          </a:xfrm>
+          <a:prstGeom prst="rect">
+            <a:avLst/>
+          </a:prstGeom>
+        </p:spPr>
+        <p:txBody>
+          <a:bodyPr vert="horz" lIns="91440" tIns="45720" rIns="91440" bIns="45720" rtlCol="0"/>
+          <a:lstStyle/>
+          <a:p>
+            <a:pPr lvl="0"/>
+            <a:r>
+              <a:rPr lang="en-US"/>
+              <a:t>Click to edit Master text styles</a:t>
+            </a:r>
+          </a:p>
+          <a:p>
+            <a:pPr lvl="1"/>
+            <a:r>
+              <a:rPr lang="en-US"/>
+              <a:t>Second level</a:t>
+            </a:r>
+          </a:p>
+          <a:p>
+            <a:pPr lvl="2"/>
+            <a:r>
+              <a:rPr lang="en-US"/>
+              <a:t>Third level</a:t>
+            </a:r>
+          </a:p>
+          <a:p>
+            <a:pPr lvl="3"/>
+            <a:r>
+              <a:rPr lang="en-US"/>
+              <a:t>Fourth level</a:t>
+            </a:r>
+          </a:p>
+          <a:p>
+            <a:pPr lvl="4"/>
+            <a:r>
+              <a:rPr lang="en-US"/>
+              <a:t>Fifth level</a:t>
+            </a:r>
+          </a:p>
+        </p:txBody>
+      </p:sp>
+      <p:sp>
+        <p:nvSpPr>
+          <p:cNvPr id="6" name="Footer Placeholder 5"/>
+          <p:cNvSpPr>
+            <a:spLocks noGrp="1"/>
+          </p:cNvSpPr>
+          <p:nvPr>
+            <p:ph type="ftr" sz="quarter" idx="4"/>
+          </p:nvPr>
+        </p:nvSpPr>
+        <p:spPr>
+          <a:xfrm>
+            <a:off x="0" y="8685213"/>
+            <a:ext cx="2971800" cy="458787"/>
+          </a:xfrm>
+          <a:prstGeom prst="rect">
+            <a:avLst/>
+          </a:prstGeom>
+        </p:spPr>
+        <p:txBody>
+          <a:bodyPr vert="horz" lIns="91440" tIns="45720" rIns="91440" bIns="45720" rtlCol="0" anchor="b"/>
+          <a:lstStyle>
+            <a:lvl1pPr algn="l">
+              <a:defRPr sz="1200"/>
+            </a:lvl1pPr>
+          </a:lstStyle>
+          <a:p>
+            <a:endParaRPr lang="en-US"/>
+          </a:p>
+        </p:txBody>
+      </p:sp>
+      <p:sp>
+        <p:nvSpPr>
+          <p:cNvPr id="7" name="Slide Number Placeholder 6"/>
+          <p:cNvSpPr>
+            <a:spLocks noGrp="1"/>
+          </p:cNvSpPr>
+          <p:nvPr>
+            <p:ph type="sldNum" sz="quarter" idx="5"/>
+          </p:nvPr>
+        </p:nvSpPr>
+        <p:spPr>
+          <a:xfrm>
+            <a:off x="3884613" y="8685213"/>
+            <a:ext cx="2971800" cy="458787"/>
+          </a:xfrm>
+          <a:prstGeom prst="rect">
+            <a:avLst/>
+          </a:prstGeom>
+        </p:spPr>
+        <p:txBody>
+          <a:bodyPr vert="horz" lIns="91440" tIns="45720" rIns="91440" bIns="45720" rtlCol="0" anchor="b"/>
+          <a:lstStyle>
+            <a:lvl1pPr algn="r">
+              <a:defRPr sz="1200"/>
+            </a:lvl1pPr>
+          </a:lstStyle>
+          <a:p>
+            <a:fld id="{D43901A2-16E7-4EB3-9117-12CD2174824C}" type="slidenum">
+              <a:rPr lang="en-US" smtClean="0"/>
+              <a:t>‹#›</a:t>
+            </a:fld>
+            <a:endParaRPr lang="en-US"/>
+          </a:p>
+        </p:txBody>
+      </p:sp>
+    </p:spTree>
+    <p:extLst>
+      <p:ext uri="{BB962C8B-B14F-4D97-AF65-F5344CB8AC3E}">
+        <p14:creationId xmlns:p14="http://schemas.microsoft.com/office/powerpoint/2010/main" val="4224171499"/>
+      </p:ext>
+    </p:extLst>
+  </p:cSld>
+  <p:clrMap bg1="lt1" tx1="dk1" bg2="lt2" tx2="dk2" accent1="accent1" accent2="accent2" accent3="accent3" accent4="accent4" accent5="accent5" accent6="accent6" hlink="hlink" folHlink="folHlink"/>
+  <p:notesStyle>
+    <a:lvl1pPr marL="0" algn="l" defTabSz="914400" rtl="0" eaLnBrk="1" latinLnBrk="0" hangingPunct="1">
+      <a:defRPr sz="1200" kern="1200">
+        <a:solidFill>
+          <a:schemeClr val="tx1"/>
+        </a:solidFill>
+        <a:latin typeface="+mn-lt"/>
+        <a:ea typeface="+mn-ea"/>
+        <a:cs typeface="+mn-cs"/>
+      </a:defRPr>
+    </a:lvl1pPr>
+    <a:lvl2pPr marL="457200" algn="l" defTabSz="914400" rtl="0" eaLnBrk="1" latinLnBrk="0" hangingPunct="1">
+      <a:defRPr sz="1200" kern="1200">
+        <a:solidFill>
+          <a:schemeClr val="tx1"/>
+        </a:solidFill>
+        <a:latin typeface="+mn-lt"/>
+        <a:ea typeface="+mn-ea"/>
+        <a:cs typeface="+mn-cs"/>
+      </a:defRPr>
+    </a:lvl2pPr>
+    <a:lvl3pPr marL="914400" algn="l" defTabSz="914400" rtl="0" eaLnBrk="1" latinLnBrk="0" hangingPunct="1">
+      <a:defRPr sz="1200" kern="1200">
+        <a:solidFill>
+          <a:schemeClr val="tx1"/>
+        </a:solidFill>
+        <a:latin typeface="+mn-lt"/>
+        <a:ea typeface="+mn-ea"/>
+        <a:cs typeface="+mn-cs"/>
+      </a:defRPr>
+    </a:lvl3pPr>
+    <a:lvl4pPr marL="1371600" algn="l" defTabSz="914400" rtl="0" eaLnBrk="1" latinLnBrk="0" hangingPunct="1">
+      <a:defRPr sz="1200" kern="1200">
+        <a:solidFill>
+          <a:schemeClr val="tx1"/>
+        </a:solidFill>
+        <a:latin typeface="+mn-lt"/>
+        <a:ea typeface="+mn-ea"/>
+        <a:cs typeface="+mn-cs"/>
+      </a:defRPr>
+    </a:lvl4pPr>
+    <a:lvl5pPr marL="1828800" algn="l" defTabSz="914400" rtl="0" eaLnBrk="1" latinLnBrk="0" hangingPunct="1">
+      <a:defRPr sz="1200" kern="1200">
+        <a:solidFill>
+          <a:schemeClr val="tx1"/>
+        </a:solidFill>
+        <a:latin typeface="+mn-lt"/>
+        <a:ea typeface="+mn-ea"/>
+        <a:cs typeface="+mn-cs"/>
+      </a:defRPr>
+    </a:lvl5pPr>
+    <a:lvl6pPr marL="2286000" algn="l" defTabSz="914400" rtl="0" eaLnBrk="1" latinLnBrk="0" hangingPunct="1">
+      <a:defRPr sz="1200" kern="1200">
+        <a:solidFill>
+          <a:schemeClr val="tx1"/>
+        </a:solidFill>
+        <a:latin typeface="+mn-lt"/>
+        <a:ea typeface="+mn-ea"/>
+        <a:cs typeface="+mn-cs"/>
+      </a:defRPr>
+    </a:lvl6pPr>
+    <a:lvl7pPr marL="2743200" algn="l" defTabSz="914400" rtl="0" eaLnBrk="1" latinLnBrk="0" hangingPunct="1">
+      <a:defRPr sz="1200" kern="1200">
+        <a:solidFill>
+          <a:schemeClr val="tx1"/>
+        </a:solidFill>
+        <a:latin typeface="+mn-lt"/>
+        <a:ea typeface="+mn-ea"/>
+        <a:cs typeface="+mn-cs"/>
+      </a:defRPr>
+    </a:lvl7pPr>
+    <a:lvl8pPr marL="3200400" algn="l" defTabSz="914400" rtl="0" eaLnBrk="1" latinLnBrk="0" hangingPunct="1">
+      <a:defRPr sz="1200" kern="1200">
+        <a:solidFill>
+          <a:schemeClr val="tx1"/>
+        </a:solidFill>
+        <a:latin typeface="+mn-lt"/>
+        <a:ea typeface="+mn-ea"/>
+        <a:cs typeface="+mn-cs"/>
+      </a:defRPr>
+    </a:lvl8pPr>
+    <a:lvl9pPr marL="3657600" algn="l" defTabSz="914400" rtl="0" eaLnBrk="1" latinLnBrk="0" hangingPunct="1">
+      <a:defRPr sz="1200" kern="1200">
+        <a:solidFill>
+          <a:schemeClr val="tx1"/>
+        </a:solidFill>
+        <a:latin typeface="+mn-lt"/>
+        <a:ea typeface="+mn-ea"/>
+        <a:cs typeface="+mn-cs"/>
+      </a:defRPr>
+    </a:lvl9pPr>
+  </p:notesStyle>
+</p:notesMaster>
+</file>
+
+<file path=ppt/notesSlides/notesSlide1.xml><?xml version="1.0" encoding="utf-8"?>
+<p:notes xmlns:a="http://schemas.openxmlformats.org/drawingml/2006/main" xmlns:r="http://schemas.openxmlformats.org/officeDocument/2006/relationships" xmlns:p="http://schemas.openxmlformats.org/presentationml/2006/main">
+  <p:cSld>
+    <p:spTree>
+      <p:nvGrpSpPr>
+        <p:cNvPr id="1" name=""/>
+        <p:cNvGrpSpPr/>
+        <p:nvPr/>
+      </p:nvGrpSpPr>
+      <p:grpSpPr>
+        <a:xfrm>
+          <a:off x="0" y="0"/>
+          <a:ext cx="0" cy="0"/>
+          <a:chOff x="0" y="0"/>
+          <a:chExt cx="0" cy="0"/>
+        </a:xfrm>
+      </p:grpSpPr>
+      <p:sp>
+        <p:nvSpPr>
+          <p:cNvPr id="2" name="Slide Image Placeholder 1"/>
+          <p:cNvSpPr>
+            <a:spLocks noGrp="1" noRot="1" noChangeAspect="1"/>
+          </p:cNvSpPr>
+          <p:nvPr>
+            <p:ph type="sldImg"/>
+          </p:nvPr>
+        </p:nvSpPr>
+        <p:spPr/>
+      </p:sp>
+      <p:sp>
+        <p:nvSpPr>
+          <p:cNvPr id="3" name="Notes Placeholder 2"/>
+          <p:cNvSpPr>
+            <a:spLocks noGrp="1"/>
+          </p:cNvSpPr>
+          <p:nvPr>
+            <p:ph type="body" idx="1"/>
+          </p:nvPr>
+        </p:nvSpPr>
+        <p:spPr/>
+        <p:txBody>
+          <a:bodyPr/>
+          <a:lstStyle/>
+          <a:p>
+            <a:r>
+              <a:rPr lang="en-US" dirty="0"/>
+              <a:t>Demo </a:t>
+            </a:r>
+            <a:r>
+              <a:rPr lang="en-US" dirty="0" err="1"/>
+              <a:t>biojupees</a:t>
+            </a:r>
+            <a:r>
+              <a:rPr lang="en-US" dirty="0"/>
+              <a:t> with a local notebook</a:t>
+            </a:r>
+          </a:p>
+        </p:txBody>
+      </p:sp>
+      <p:sp>
+        <p:nvSpPr>
+          <p:cNvPr id="4" name="Slide Number Placeholder 3"/>
+          <p:cNvSpPr>
+            <a:spLocks noGrp="1"/>
+          </p:cNvSpPr>
+          <p:nvPr>
+            <p:ph type="sldNum" sz="quarter" idx="5"/>
+          </p:nvPr>
+        </p:nvSpPr>
+        <p:spPr/>
+        <p:txBody>
+          <a:bodyPr/>
+          <a:lstStyle/>
+          <a:p>
+            <a:fld id="{D43901A2-16E7-4EB3-9117-12CD2174824C}" type="slidenum">
+              <a:rPr lang="en-US" smtClean="0"/>
+              <a:t>5</a:t>
+            </a:fld>
+            <a:endParaRPr lang="en-US"/>
+          </a:p>
+        </p:txBody>
+      </p:sp>
+    </p:spTree>
+    <p:extLst>
+      <p:ext uri="{BB962C8B-B14F-4D97-AF65-F5344CB8AC3E}">
+        <p14:creationId xmlns:p14="http://schemas.microsoft.com/office/powerpoint/2010/main" val="1903789302"/>
+      </p:ext>
+    </p:extLst>
+  </p:cSld>
+  <p:clrMapOvr>
+    <a:masterClrMapping/>
+  </p:clrMapOvr>
+</p:notes>
+</file>
+
+<file path=ppt/notesSlides/notesSlide2.xml><?xml version="1.0" encoding="utf-8"?>
+<p:notes xmlns:a="http://schemas.openxmlformats.org/drawingml/2006/main" xmlns:r="http://schemas.openxmlformats.org/officeDocument/2006/relationships" xmlns:p="http://schemas.openxmlformats.org/presentationml/2006/main">
+  <p:cSld>
+    <p:spTree>
+      <p:nvGrpSpPr>
+        <p:cNvPr id="1" name=""/>
+        <p:cNvGrpSpPr/>
+        <p:nvPr/>
+      </p:nvGrpSpPr>
+      <p:grpSpPr>
+        <a:xfrm>
+          <a:off x="0" y="0"/>
+          <a:ext cx="0" cy="0"/>
+          <a:chOff x="0" y="0"/>
+          <a:chExt cx="0" cy="0"/>
+        </a:xfrm>
+      </p:grpSpPr>
+      <p:sp>
+        <p:nvSpPr>
+          <p:cNvPr id="2" name="Slide Image Placeholder 1"/>
+          <p:cNvSpPr>
+            <a:spLocks noGrp="1" noRot="1" noChangeAspect="1"/>
+          </p:cNvSpPr>
+          <p:nvPr>
+            <p:ph type="sldImg"/>
+          </p:nvPr>
+        </p:nvSpPr>
+        <p:spPr/>
+      </p:sp>
+      <p:sp>
+        <p:nvSpPr>
+          <p:cNvPr id="3" name="Notes Placeholder 2"/>
+          <p:cNvSpPr>
+            <a:spLocks noGrp="1"/>
+          </p:cNvSpPr>
+          <p:nvPr>
+            <p:ph type="body" idx="1"/>
+          </p:nvPr>
+        </p:nvSpPr>
+        <p:spPr/>
+        <p:txBody>
+          <a:bodyPr/>
+          <a:lstStyle/>
+          <a:p>
+            <a:r>
+              <a:rPr lang="en-US" dirty="0"/>
+              <a:t>Explain:</a:t>
+            </a:r>
+          </a:p>
+          <a:p>
+            <a:pPr marL="171450" indent="-171450">
+              <a:buFont typeface="Arial" panose="020B0604020202020204" pitchFamily="34" charset="0"/>
+              <a:buChar char="•"/>
+            </a:pPr>
+            <a:r>
+              <a:rPr lang="en-US" dirty="0"/>
+              <a:t>What is a shell script?</a:t>
+            </a:r>
+          </a:p>
+          <a:p>
+            <a:pPr marL="171450" indent="-171450">
+              <a:buFont typeface="Arial" panose="020B0604020202020204" pitchFamily="34" charset="0"/>
+              <a:buChar char="•"/>
+            </a:pPr>
+            <a:r>
+              <a:rPr lang="en-US" dirty="0"/>
+              <a:t>What is a CLI?</a:t>
+            </a:r>
+          </a:p>
+          <a:p>
+            <a:pPr marL="171450" indent="-171450">
+              <a:buFont typeface="Arial" panose="020B0604020202020204" pitchFamily="34" charset="0"/>
+              <a:buChar char="•"/>
+            </a:pPr>
+            <a:r>
+              <a:rPr lang="en-US" dirty="0"/>
+              <a:t>Why do we use one?</a:t>
+            </a:r>
+          </a:p>
+          <a:p>
+            <a:pPr marL="171450" indent="-171450">
+              <a:buFont typeface="Arial" panose="020B0604020202020204" pitchFamily="34" charset="0"/>
+              <a:buChar char="•"/>
+            </a:pPr>
+            <a:r>
+              <a:rPr lang="en-US" dirty="0"/>
+              <a:t>Three basic commands</a:t>
+            </a:r>
+          </a:p>
+        </p:txBody>
+      </p:sp>
+      <p:sp>
+        <p:nvSpPr>
+          <p:cNvPr id="4" name="Slide Number Placeholder 3"/>
+          <p:cNvSpPr>
+            <a:spLocks noGrp="1"/>
+          </p:cNvSpPr>
+          <p:nvPr>
+            <p:ph type="sldNum" sz="quarter" idx="5"/>
+          </p:nvPr>
+        </p:nvSpPr>
+        <p:spPr/>
+        <p:txBody>
+          <a:bodyPr/>
+          <a:lstStyle/>
+          <a:p>
+            <a:fld id="{D43901A2-16E7-4EB3-9117-12CD2174824C}" type="slidenum">
+              <a:rPr lang="en-US" smtClean="0"/>
+              <a:t>10</a:t>
+            </a:fld>
+            <a:endParaRPr lang="en-US"/>
+          </a:p>
+        </p:txBody>
+      </p:sp>
+    </p:spTree>
+    <p:extLst>
+      <p:ext uri="{BB962C8B-B14F-4D97-AF65-F5344CB8AC3E}">
+        <p14:creationId xmlns:p14="http://schemas.microsoft.com/office/powerpoint/2010/main" val="1306900891"/>
+      </p:ext>
+    </p:extLst>
+  </p:cSld>
+  <p:clrMapOvr>
+    <a:masterClrMapping/>
+  </p:clrMapOvr>
+</p:notes>
+</file>
+
 <file path=ppt/slideLayouts/slideLayout1.xml><?xml version="1.0" encoding="utf-8"?>
 <p:sldLayout xmlns:a="http://schemas.openxmlformats.org/drawingml/2006/main" xmlns:r="http://schemas.openxmlformats.org/officeDocument/2006/relationships" xmlns:p="http://schemas.openxmlformats.org/presentationml/2006/main" type="title" preserve="1">
   <p:cSld name="Title Slide">
@@ -310,7 +883,7 @@
           <a:p>
             <a:fld id="{6DAA18C8-DF49-47C1-BF04-0A5F852560AD}" type="datetimeFigureOut">
               <a:rPr lang="en-US" smtClean="0"/>
-              <a:t>3/20/2019</a:t>
+              <a:t>3/21/2019</a:t>
             </a:fld>
             <a:endParaRPr lang="en-US"/>
           </a:p>
@@ -608,7 +1181,7 @@
           <a:p>
             <a:fld id="{6DAA18C8-DF49-47C1-BF04-0A5F852560AD}" type="datetimeFigureOut">
               <a:rPr lang="en-US" smtClean="0"/>
-              <a:t>3/20/2019</a:t>
+              <a:t>3/21/2019</a:t>
             </a:fld>
             <a:endParaRPr lang="en-US"/>
           </a:p>
@@ -800,7 +1373,7 @@
           <a:p>
             <a:fld id="{6DAA18C8-DF49-47C1-BF04-0A5F852560AD}" type="datetimeFigureOut">
               <a:rPr lang="en-US" smtClean="0"/>
-              <a:t>3/20/2019</a:t>
+              <a:t>3/21/2019</a:t>
             </a:fld>
             <a:endParaRPr lang="en-US"/>
           </a:p>
@@ -1061,7 +1634,7 @@
           <a:p>
             <a:fld id="{6DAA18C8-DF49-47C1-BF04-0A5F852560AD}" type="datetimeFigureOut">
               <a:rPr lang="en-US" smtClean="0"/>
-              <a:t>3/20/2019</a:t>
+              <a:t>3/21/2019</a:t>
             </a:fld>
             <a:endParaRPr lang="en-US"/>
           </a:p>
@@ -1485,7 +2058,7 @@
           <a:p>
             <a:fld id="{6DAA18C8-DF49-47C1-BF04-0A5F852560AD}" type="datetimeFigureOut">
               <a:rPr lang="en-US" smtClean="0"/>
-              <a:t>3/20/2019</a:t>
+              <a:t>3/21/2019</a:t>
             </a:fld>
             <a:endParaRPr lang="en-US"/>
           </a:p>
@@ -2022,7 +2595,7 @@
           <a:p>
             <a:fld id="{6DAA18C8-DF49-47C1-BF04-0A5F852560AD}" type="datetimeFigureOut">
               <a:rPr lang="en-US" smtClean="0"/>
-              <a:t>3/20/2019</a:t>
+              <a:t>3/21/2019</a:t>
             </a:fld>
             <a:endParaRPr lang="en-US"/>
           </a:p>
@@ -2886,7 +3459,7 @@
           <a:p>
             <a:fld id="{6DAA18C8-DF49-47C1-BF04-0A5F852560AD}" type="datetimeFigureOut">
               <a:rPr lang="en-US" smtClean="0"/>
-              <a:t>3/20/2019</a:t>
+              <a:t>3/21/2019</a:t>
             </a:fld>
             <a:endParaRPr lang="en-US"/>
           </a:p>
@@ -3056,7 +3629,7 @@
           <a:p>
             <a:fld id="{6DAA18C8-DF49-47C1-BF04-0A5F852560AD}" type="datetimeFigureOut">
               <a:rPr lang="en-US" smtClean="0"/>
-              <a:t>3/20/2019</a:t>
+              <a:t>3/21/2019</a:t>
             </a:fld>
             <a:endParaRPr lang="en-US"/>
           </a:p>
@@ -3240,7 +3813,7 @@
           <a:p>
             <a:fld id="{6DAA18C8-DF49-47C1-BF04-0A5F852560AD}" type="datetimeFigureOut">
               <a:rPr lang="en-US" smtClean="0"/>
-              <a:t>3/20/2019</a:t>
+              <a:t>3/21/2019</a:t>
             </a:fld>
             <a:endParaRPr lang="en-US"/>
           </a:p>
@@ -3334,10 +3907,9 @@
           <a:lstStyle/>
           <a:p>
             <a:r>
-              <a:rPr lang="en-US"/>
+              <a:rPr lang="en-US" dirty="0"/>
               <a:t>Click to edit Master title style</a:t>
             </a:r>
-            <a:endParaRPr lang="en-US" dirty="0"/>
           </a:p>
         </p:txBody>
       </p:sp>
@@ -3351,45 +3923,49 @@
             <p:ph idx="1"/>
           </p:nvPr>
         </p:nvSpPr>
-        <p:spPr/>
-        <p:txBody>
-          <a:bodyPr/>
+        <p:spPr>
+          <a:xfrm>
+            <a:off x="887766" y="1732450"/>
+            <a:ext cx="7562901" cy="4058751"/>
+          </a:xfrm>
+        </p:spPr>
+        <p:txBody>
+          <a:bodyPr anchor="ctr"/>
           <a:lstStyle/>
           <a:p>
             <a:pPr lvl="0"/>
             <a:r>
-              <a:rPr lang="en-US"/>
+              <a:rPr lang="en-US" dirty="0"/>
               <a:t>Click to edit Master text styles</a:t>
             </a:r>
           </a:p>
           <a:p>
             <a:pPr lvl="1"/>
             <a:r>
-              <a:rPr lang="en-US"/>
+              <a:rPr lang="en-US" dirty="0"/>
               <a:t>Second level</a:t>
             </a:r>
           </a:p>
           <a:p>
             <a:pPr lvl="2"/>
             <a:r>
-              <a:rPr lang="en-US"/>
+              <a:rPr lang="en-US" dirty="0"/>
               <a:t>Third level</a:t>
             </a:r>
           </a:p>
           <a:p>
             <a:pPr lvl="3"/>
             <a:r>
-              <a:rPr lang="en-US"/>
+              <a:rPr lang="en-US" dirty="0"/>
               <a:t>Fourth level</a:t>
             </a:r>
           </a:p>
           <a:p>
             <a:pPr lvl="4"/>
             <a:r>
-              <a:rPr lang="en-US"/>
+              <a:rPr lang="en-US" dirty="0"/>
               <a:t>Fifth level</a:t>
             </a:r>
-            <a:endParaRPr lang="en-US" dirty="0"/>
           </a:p>
         </p:txBody>
       </p:sp>
@@ -3410,7 +3986,7 @@
           <a:p>
             <a:fld id="{6DAA18C8-DF49-47C1-BF04-0A5F852560AD}" type="datetimeFigureOut">
               <a:rPr lang="en-US" smtClean="0"/>
-              <a:t>3/20/2019</a:t>
+              <a:t>3/21/2019</a:t>
             </a:fld>
             <a:endParaRPr lang="en-US"/>
           </a:p>
@@ -3654,7 +4230,7 @@
           <a:p>
             <a:fld id="{6DAA18C8-DF49-47C1-BF04-0A5F852560AD}" type="datetimeFigureOut">
               <a:rPr lang="en-US" smtClean="0"/>
-              <a:t>3/20/2019</a:t>
+              <a:t>3/21/2019</a:t>
             </a:fld>
             <a:endParaRPr lang="en-US"/>
           </a:p>
@@ -3772,45 +4348,44 @@
           </a:xfrm>
         </p:spPr>
         <p:txBody>
-          <a:bodyPr anchor="t">
+          <a:bodyPr anchor="ctr">
             <a:normAutofit/>
           </a:bodyPr>
           <a:lstStyle/>
           <a:p>
             <a:pPr lvl="0"/>
             <a:r>
-              <a:rPr lang="en-US"/>
+              <a:rPr lang="en-US" dirty="0"/>
               <a:t>Click to edit Master text styles</a:t>
             </a:r>
           </a:p>
           <a:p>
             <a:pPr lvl="1"/>
             <a:r>
-              <a:rPr lang="en-US"/>
+              <a:rPr lang="en-US" dirty="0"/>
               <a:t>Second level</a:t>
             </a:r>
           </a:p>
           <a:p>
             <a:pPr lvl="2"/>
             <a:r>
-              <a:rPr lang="en-US"/>
+              <a:rPr lang="en-US" dirty="0"/>
               <a:t>Third level</a:t>
             </a:r>
           </a:p>
           <a:p>
             <a:pPr lvl="3"/>
             <a:r>
-              <a:rPr lang="en-US"/>
+              <a:rPr lang="en-US" dirty="0"/>
               <a:t>Fourth level</a:t>
             </a:r>
           </a:p>
           <a:p>
             <a:pPr lvl="4"/>
             <a:r>
-              <a:rPr lang="en-US"/>
+              <a:rPr lang="en-US" dirty="0"/>
               <a:t>Fifth level</a:t>
             </a:r>
-            <a:endParaRPr lang="en-US" dirty="0"/>
           </a:p>
         </p:txBody>
       </p:sp>
@@ -3831,45 +4406,44 @@
           </a:xfrm>
         </p:spPr>
         <p:txBody>
-          <a:bodyPr anchor="t">
+          <a:bodyPr anchor="ctr">
             <a:normAutofit/>
           </a:bodyPr>
           <a:lstStyle/>
           <a:p>
             <a:pPr lvl="0"/>
             <a:r>
-              <a:rPr lang="en-US"/>
+              <a:rPr lang="en-US" dirty="0"/>
               <a:t>Click to edit Master text styles</a:t>
             </a:r>
           </a:p>
           <a:p>
             <a:pPr lvl="1"/>
             <a:r>
-              <a:rPr lang="en-US"/>
+              <a:rPr lang="en-US" dirty="0"/>
               <a:t>Second level</a:t>
             </a:r>
           </a:p>
           <a:p>
             <a:pPr lvl="2"/>
             <a:r>
-              <a:rPr lang="en-US"/>
+              <a:rPr lang="en-US" dirty="0"/>
               <a:t>Third level</a:t>
             </a:r>
           </a:p>
           <a:p>
             <a:pPr lvl="3"/>
             <a:r>
-              <a:rPr lang="en-US"/>
+              <a:rPr lang="en-US" dirty="0"/>
               <a:t>Fourth level</a:t>
             </a:r>
           </a:p>
           <a:p>
             <a:pPr lvl="4"/>
             <a:r>
-              <a:rPr lang="en-US"/>
+              <a:rPr lang="en-US" dirty="0"/>
               <a:t>Fifth level</a:t>
             </a:r>
-            <a:endParaRPr lang="en-US" dirty="0"/>
           </a:p>
         </p:txBody>
       </p:sp>
@@ -3890,7 +4464,7 @@
           <a:p>
             <a:fld id="{6DAA18C8-DF49-47C1-BF04-0A5F852560AD}" type="datetimeFigureOut">
               <a:rPr lang="en-US" smtClean="0"/>
-              <a:t>3/20/2019</a:t>
+              <a:t>3/21/2019</a:t>
             </a:fld>
             <a:endParaRPr lang="en-US"/>
           </a:p>
@@ -4356,7 +4930,7 @@
           <a:p>
             <a:fld id="{6DAA18C8-DF49-47C1-BF04-0A5F852560AD}" type="datetimeFigureOut">
               <a:rPr lang="en-US" smtClean="0"/>
-              <a:t>3/20/2019</a:t>
+              <a:t>3/21/2019</a:t>
             </a:fld>
             <a:endParaRPr lang="en-US"/>
           </a:p>
@@ -4474,7 +5048,7 @@
           <a:p>
             <a:fld id="{6DAA18C8-DF49-47C1-BF04-0A5F852560AD}" type="datetimeFigureOut">
               <a:rPr lang="en-US" smtClean="0"/>
-              <a:t>3/20/2019</a:t>
+              <a:t>3/21/2019</a:t>
             </a:fld>
             <a:endParaRPr lang="en-US"/>
           </a:p>
@@ -4569,7 +5143,7 @@
           <a:p>
             <a:fld id="{6DAA18C8-DF49-47C1-BF04-0A5F852560AD}" type="datetimeFigureOut">
               <a:rPr lang="en-US" smtClean="0"/>
-              <a:t>3/20/2019</a:t>
+              <a:t>3/21/2019</a:t>
             </a:fld>
             <a:endParaRPr lang="en-US"/>
           </a:p>
@@ -4824,7 +5398,7 @@
           <a:p>
             <a:fld id="{6DAA18C8-DF49-47C1-BF04-0A5F852560AD}" type="datetimeFigureOut">
               <a:rPr lang="en-US" smtClean="0"/>
-              <a:t>3/20/2019</a:t>
+              <a:t>3/21/2019</a:t>
             </a:fld>
             <a:endParaRPr lang="en-US"/>
           </a:p>
@@ -5124,7 +5698,7 @@
           <a:p>
             <a:fld id="{6DAA18C8-DF49-47C1-BF04-0A5F852560AD}" type="datetimeFigureOut">
               <a:rPr lang="en-US" smtClean="0"/>
-              <a:t>3/20/2019</a:t>
+              <a:t>3/21/2019</a:t>
             </a:fld>
             <a:endParaRPr lang="en-US"/>
           </a:p>
@@ -5240,10 +5814,9 @@
           <a:lstStyle/>
           <a:p>
             <a:r>
-              <a:rPr lang="en-US"/>
+              <a:rPr lang="en-US" dirty="0"/>
               <a:t>Click to edit Master title style</a:t>
             </a:r>
-            <a:endParaRPr lang="en-US" dirty="0"/>
           </a:p>
         </p:txBody>
       </p:sp>
@@ -5259,8 +5832,8 @@
         </p:nvSpPr>
         <p:spPr>
           <a:xfrm>
-            <a:off x="685346" y="1732450"/>
-            <a:ext cx="7765322" cy="4058751"/>
+            <a:off x="852256" y="1732450"/>
+            <a:ext cx="7598412" cy="4058751"/>
           </a:xfrm>
           <a:prstGeom prst="rect">
             <a:avLst/>
@@ -5274,45 +5847,44 @@
           </a:effectLst>
         </p:spPr>
         <p:txBody>
-          <a:bodyPr vert="horz" lIns="91440" tIns="45720" rIns="91440" bIns="45720" rtlCol="0" anchor="t">
+          <a:bodyPr vert="horz" lIns="91440" tIns="45720" rIns="91440" bIns="45720" rtlCol="0" anchor="ctr">
             <a:normAutofit/>
           </a:bodyPr>
           <a:lstStyle/>
           <a:p>
             <a:pPr lvl="0"/>
             <a:r>
-              <a:rPr lang="en-US"/>
+              <a:rPr lang="en-US" dirty="0"/>
               <a:t>Click to edit Master text styles</a:t>
             </a:r>
           </a:p>
           <a:p>
             <a:pPr lvl="1"/>
             <a:r>
-              <a:rPr lang="en-US"/>
+              <a:rPr lang="en-US" dirty="0"/>
               <a:t>Second level</a:t>
             </a:r>
           </a:p>
           <a:p>
             <a:pPr lvl="2"/>
             <a:r>
-              <a:rPr lang="en-US"/>
+              <a:rPr lang="en-US" dirty="0"/>
               <a:t>Third level</a:t>
             </a:r>
           </a:p>
           <a:p>
             <a:pPr lvl="3"/>
             <a:r>
-              <a:rPr lang="en-US"/>
+              <a:rPr lang="en-US" dirty="0"/>
               <a:t>Fourth level</a:t>
             </a:r>
           </a:p>
           <a:p>
             <a:pPr lvl="4"/>
             <a:r>
-              <a:rPr lang="en-US"/>
+              <a:rPr lang="en-US" dirty="0"/>
               <a:t>Fifth level</a:t>
             </a:r>
-            <a:endParaRPr lang="en-US" dirty="0"/>
           </a:p>
         </p:txBody>
       </p:sp>
@@ -5358,7 +5930,7 @@
           <a:p>
             <a:fld id="{6DAA18C8-DF49-47C1-BF04-0A5F852560AD}" type="datetimeFigureOut">
               <a:rPr lang="en-US" smtClean="0"/>
-              <a:t>3/20/2019</a:t>
+              <a:t>3/21/2019</a:t>
             </a:fld>
             <a:endParaRPr lang="en-US"/>
           </a:p>
@@ -5485,7 +6057,7 @@
   </p:sldLayoutIdLst>
   <p:txStyles>
     <p:titleStyle>
-      <a:lvl1pPr algn="ctr" defTabSz="457200" rtl="0" eaLnBrk="1" latinLnBrk="0" hangingPunct="1">
+      <a:lvl1pPr algn="l" defTabSz="457200" rtl="0" eaLnBrk="1" latinLnBrk="0" hangingPunct="1">
         <a:spcBef>
           <a:spcPct val="0"/>
         </a:spcBef>
@@ -6128,10 +6700,10 @@
       </p:grpSpPr>
       <p:sp>
         <p:nvSpPr>
-          <p:cNvPr id="2" name="Title 1">
+          <p:cNvPr id="7" name="Title 6">
             <a:extLst>
               <a:ext uri="{FF2B5EF4-FFF2-40B4-BE49-F238E27FC236}">
-                <a16:creationId xmlns:a16="http://schemas.microsoft.com/office/drawing/2014/main" id="{344BBF94-4855-4C99-AC7B-94EE12252B2C}"/>
+                <a16:creationId xmlns:a16="http://schemas.microsoft.com/office/drawing/2014/main" id="{D4541886-406C-4DB7-B713-EC2154E8DE4F}"/>
               </a:ext>
             </a:extLst>
           </p:cNvPr>
@@ -6149,25 +6721,17 @@
           <a:p>
             <a:r>
               <a:rPr lang="en-US" dirty="0"/>
-              <a:t>Step Four – push back to </a:t>
-            </a:r>
-            <a:r>
-              <a:rPr lang="en-US" dirty="0" err="1"/>
-              <a:t>Github</a:t>
-            </a:r>
-            <a:r>
-              <a:rPr lang="en-US" dirty="0"/>
-              <a:t> </a:t>
-            </a:r>
-          </a:p>
-        </p:txBody>
-      </p:sp>
-      <p:sp>
-        <p:nvSpPr>
-          <p:cNvPr id="3" name="Content Placeholder 2">
+              <a:t>Bare minimum shell script</a:t>
+            </a:r>
+          </a:p>
+        </p:txBody>
+      </p:sp>
+      <p:sp>
+        <p:nvSpPr>
+          <p:cNvPr id="8" name="Content Placeholder 7">
             <a:extLst>
               <a:ext uri="{FF2B5EF4-FFF2-40B4-BE49-F238E27FC236}">
-                <a16:creationId xmlns:a16="http://schemas.microsoft.com/office/drawing/2014/main" id="{9C9B9051-7A39-4F06-99D4-89C7062989E9}"/>
+                <a16:creationId xmlns:a16="http://schemas.microsoft.com/office/drawing/2014/main" id="{B831AB3F-9007-415F-BA32-3342130E5592}"/>
               </a:ext>
             </a:extLst>
           </p:cNvPr>
@@ -6180,57 +6744,174 @@
         </p:nvSpPr>
         <p:spPr/>
         <p:txBody>
-          <a:bodyPr/>
-          <a:lstStyle/>
+          <a:bodyPr anchor="ctr"/>
+          <a:lstStyle/>
+          <a:p>
+            <a:r>
+              <a:rPr lang="en-US" dirty="0"/>
+              <a:t>Command Line Interface</a:t>
+            </a:r>
+          </a:p>
           <a:p>
             <a:endParaRPr lang="en-US" dirty="0"/>
           </a:p>
           <a:p>
             <a:r>
-              <a:rPr lang="en-US" dirty="0"/>
-              <a:t>git push origin master</a:t>
-            </a:r>
-          </a:p>
-          <a:p>
-            <a:pPr lvl="1"/>
-            <a:r>
-              <a:rPr lang="en-US" dirty="0"/>
-              <a:t> When your depo is made it saves the original repo address as ‘origin’</a:t>
-            </a:r>
-          </a:p>
-          <a:p>
-            <a:pPr lvl="1"/>
-            <a:r>
-              <a:rPr lang="en-US" dirty="0"/>
-              <a:t>‘master’ is the name of the branch you want to send</a:t>
-            </a:r>
-          </a:p>
-          <a:p>
-            <a:pPr lvl="1"/>
+              <a:rPr lang="en-US" sz="1600" dirty="0" err="1">
+                <a:latin typeface="Consolas" panose="020B0609020204030204" pitchFamily="49" charset="0"/>
+              </a:rPr>
+              <a:t>mkdir</a:t>
+            </a:r>
+            <a:r>
+              <a:rPr lang="en-US" sz="1600" dirty="0">
+                <a:latin typeface="Consolas" panose="020B0609020204030204" pitchFamily="49" charset="0"/>
+              </a:rPr>
+              <a:t> folder			:	</a:t>
+            </a:r>
+            <a:r>
+              <a:rPr lang="en-US" dirty="0">
+                <a:latin typeface="+mj-lt"/>
+              </a:rPr>
+              <a:t>make new directory</a:t>
+            </a:r>
+            <a:endParaRPr lang="en-US" sz="1600" dirty="0">
+              <a:latin typeface="Consolas" panose="020B0609020204030204" pitchFamily="49" charset="0"/>
+            </a:endParaRPr>
+          </a:p>
+          <a:p>
+            <a:r>
+              <a:rPr lang="en-US" sz="1600" dirty="0">
+                <a:latin typeface="Consolas" panose="020B0609020204030204" pitchFamily="49" charset="0"/>
+              </a:rPr>
+              <a:t>cd folder/subfolder</a:t>
+            </a:r>
+            <a:r>
+              <a:rPr lang="en-US" dirty="0"/>
+              <a:t>	:	change directory </a:t>
+            </a:r>
+          </a:p>
+          <a:p>
+            <a:pPr marL="1170000" lvl="3" indent="0">
+              <a:buNone/>
+            </a:pPr>
+            <a:r>
+              <a:rPr lang="en-US" dirty="0"/>
+              <a:t>** Note Linux uses / vs \	 on Windows **</a:t>
+            </a:r>
+          </a:p>
+          <a:p>
+            <a:pPr marL="756000" lvl="2" indent="0">
+              <a:spcBef>
+                <a:spcPts val="0"/>
+              </a:spcBef>
+              <a:spcAft>
+                <a:spcPts val="0"/>
+              </a:spcAft>
+              <a:buNone/>
+            </a:pPr>
+            <a:r>
+              <a:rPr lang="en-US" dirty="0"/>
+              <a:t>.	 = This folder</a:t>
+            </a:r>
+          </a:p>
+          <a:p>
+            <a:pPr marL="756000" lvl="2" indent="0">
+              <a:spcBef>
+                <a:spcPts val="0"/>
+              </a:spcBef>
+              <a:spcAft>
+                <a:spcPts val="0"/>
+              </a:spcAft>
+              <a:buNone/>
+            </a:pPr>
+            <a:r>
+              <a:rPr lang="en-US" dirty="0"/>
+              <a:t>..  = One folder up</a:t>
+            </a:r>
+          </a:p>
+          <a:p>
+            <a:pPr marL="756000" lvl="2" indent="0">
+              <a:spcBef>
+                <a:spcPts val="0"/>
+              </a:spcBef>
+              <a:spcAft>
+                <a:spcPts val="0"/>
+              </a:spcAft>
+              <a:buNone/>
+            </a:pPr>
+            <a:r>
+              <a:rPr lang="en-US" dirty="0"/>
+              <a:t>~ = Your home directory</a:t>
+            </a:r>
+          </a:p>
+          <a:p>
+            <a:pPr marL="244350" indent="-171450">
+              <a:spcBef>
+                <a:spcPts val="0"/>
+              </a:spcBef>
+              <a:spcAft>
+                <a:spcPts val="0"/>
+              </a:spcAft>
+            </a:pPr>
+            <a:endParaRPr lang="en-US" sz="1600" dirty="0">
+              <a:latin typeface="Consolas" panose="020B0609020204030204" pitchFamily="49" charset="0"/>
+            </a:endParaRPr>
+          </a:p>
+          <a:p>
+            <a:pPr marL="244350" indent="-171450">
+              <a:spcBef>
+                <a:spcPts val="0"/>
+              </a:spcBef>
+              <a:spcAft>
+                <a:spcPts val="0"/>
+              </a:spcAft>
+            </a:pPr>
+            <a:r>
+              <a:rPr lang="en-US" sz="1600" dirty="0">
+                <a:latin typeface="Consolas" panose="020B0609020204030204" pitchFamily="49" charset="0"/>
+              </a:rPr>
+              <a:t>ls</a:t>
+            </a:r>
+            <a:r>
+              <a:rPr lang="en-US" dirty="0"/>
+              <a:t>					:	list directory contents </a:t>
+            </a:r>
+          </a:p>
+          <a:p>
+            <a:pPr marL="244350" indent="-171450">
+              <a:spcBef>
+                <a:spcPts val="0"/>
+              </a:spcBef>
+              <a:spcAft>
+                <a:spcPts val="0"/>
+              </a:spcAft>
+            </a:pPr>
             <a:endParaRPr lang="en-US" dirty="0"/>
           </a:p>
           <a:p>
-            <a:r>
-              <a:rPr lang="en-US" dirty="0"/>
-              <a:t>Go to your </a:t>
-            </a:r>
-            <a:r>
-              <a:rPr lang="en-US" dirty="0" err="1"/>
-              <a:t>Github</a:t>
-            </a:r>
-            <a:r>
-              <a:rPr lang="en-US" dirty="0"/>
-              <a:t> repo and verify your new folder and file is there</a:t>
-            </a:r>
-          </a:p>
-          <a:p>
-            <a:endParaRPr lang="en-US" dirty="0"/>
-          </a:p>
-          <a:p>
-            <a:endParaRPr lang="en-US" dirty="0"/>
-          </a:p>
-          <a:p>
-            <a:pPr lvl="1"/>
+            <a:pPr marL="244350" indent="-171450">
+              <a:spcBef>
+                <a:spcPts val="0"/>
+              </a:spcBef>
+              <a:spcAft>
+                <a:spcPts val="0"/>
+              </a:spcAft>
+            </a:pPr>
+            <a:r>
+              <a:rPr lang="en-US" dirty="0"/>
+              <a:t>Tab for autocomplete</a:t>
+            </a:r>
+          </a:p>
+          <a:p>
+            <a:pPr marL="756000" lvl="2" indent="0">
+              <a:spcBef>
+                <a:spcPts val="0"/>
+              </a:spcBef>
+              <a:spcAft>
+                <a:spcPts val="0"/>
+              </a:spcAft>
+              <a:buNone/>
+            </a:pPr>
             <a:endParaRPr lang="en-US" dirty="0"/>
           </a:p>
         </p:txBody>
@@ -6238,7 +6919,7 @@
     </p:spTree>
     <p:extLst>
       <p:ext uri="{BB962C8B-B14F-4D97-AF65-F5344CB8AC3E}">
-        <p14:creationId xmlns:p14="http://schemas.microsoft.com/office/powerpoint/2010/main" val="2891583032"/>
+        <p14:creationId xmlns:p14="http://schemas.microsoft.com/office/powerpoint/2010/main" val="2965437628"/>
       </p:ext>
     </p:extLst>
   </p:cSld>
@@ -6270,7 +6951,7 @@
           <p:cNvPr id="2" name="Title 1">
             <a:extLst>
               <a:ext uri="{FF2B5EF4-FFF2-40B4-BE49-F238E27FC236}">
-                <a16:creationId xmlns:a16="http://schemas.microsoft.com/office/drawing/2014/main" id="{DAAA0C63-4A1B-4481-B0C4-1672B8981153}"/>
+                <a16:creationId xmlns:a16="http://schemas.microsoft.com/office/drawing/2014/main" id="{D400C865-0914-4BD5-A773-3CC9EEDFDE5C}"/>
               </a:ext>
             </a:extLst>
           </p:cNvPr>
@@ -6283,72 +6964,58 @@
         </p:nvSpPr>
         <p:spPr/>
         <p:txBody>
-          <a:bodyPr/>
-          <a:lstStyle/>
-          <a:p>
-            <a:r>
-              <a:rPr lang="en-US" dirty="0"/>
-              <a:t>Step Five – make more changes </a:t>
-            </a:r>
-          </a:p>
-        </p:txBody>
-      </p:sp>
-      <p:sp>
-        <p:nvSpPr>
-          <p:cNvPr id="3" name="Content Placeholder 2">
+          <a:bodyPr>
+            <a:normAutofit fontScale="90000"/>
+          </a:bodyPr>
+          <a:lstStyle/>
+          <a:p>
+            <a:r>
+              <a:rPr lang="en-US" dirty="0"/>
+              <a:t>3. Clone a copy: </a:t>
+            </a:r>
+            <a:br>
+              <a:rPr lang="en-US" dirty="0"/>
+            </a:br>
+            <a:r>
+              <a:rPr lang="en-US" dirty="0"/>
+              <a:t>remote repo &gt;&gt; local repo</a:t>
+            </a:r>
+          </a:p>
+        </p:txBody>
+      </p:sp>
+      <p:pic>
+        <p:nvPicPr>
+          <p:cNvPr id="9" name="Picture 8">
             <a:extLst>
               <a:ext uri="{FF2B5EF4-FFF2-40B4-BE49-F238E27FC236}">
-                <a16:creationId xmlns:a16="http://schemas.microsoft.com/office/drawing/2014/main" id="{7698E89F-A9C3-4B7A-B59B-9DBDC11A8C32}"/>
+                <a16:creationId xmlns:a16="http://schemas.microsoft.com/office/drawing/2014/main" id="{1463C325-4C5E-47C9-8BFB-4835BF5434AB}"/>
               </a:ext>
             </a:extLst>
           </p:cNvPr>
-          <p:cNvSpPr>
-            <a:spLocks noGrp="1"/>
-          </p:cNvSpPr>
-          <p:nvPr>
-            <p:ph idx="1"/>
-          </p:nvPr>
-        </p:nvSpPr>
-        <p:spPr/>
-        <p:txBody>
-          <a:bodyPr/>
-          <a:lstStyle/>
-          <a:p>
-            <a:r>
-              <a:rPr lang="en-US" dirty="0"/>
-              <a:t>You can make changes to a repo in your browser</a:t>
-            </a:r>
-          </a:p>
-          <a:p>
-            <a:r>
-              <a:rPr lang="en-US" dirty="0"/>
-              <a:t>Click on your text file</a:t>
-            </a:r>
-          </a:p>
-          <a:p>
-            <a:r>
-              <a:rPr lang="en-US" dirty="0"/>
-              <a:t>Click the little pencil button to start editing </a:t>
-            </a:r>
-          </a:p>
-          <a:p>
-            <a:r>
-              <a:rPr lang="en-US" dirty="0"/>
-              <a:t>Add your email address</a:t>
-            </a:r>
-          </a:p>
-          <a:p>
-            <a:r>
-              <a:rPr lang="en-US" dirty="0"/>
-              <a:t>Scroll down and click the ‘Commit changes’ button</a:t>
-            </a:r>
-          </a:p>
-        </p:txBody>
-      </p:sp>
+          <p:cNvPicPr>
+            <a:picLocks noChangeAspect="1"/>
+          </p:cNvPicPr>
+          <p:nvPr/>
+        </p:nvPicPr>
+        <p:blipFill rotWithShape="1">
+          <a:blip r:embed="rId2"/>
+          <a:srcRect b="44865"/>
+          <a:stretch/>
+        </p:blipFill>
+        <p:spPr>
+          <a:xfrm>
+            <a:off x="955224" y="2198865"/>
+            <a:ext cx="7006948" cy="2460270"/>
+          </a:xfrm>
+          <a:prstGeom prst="rect">
+            <a:avLst/>
+          </a:prstGeom>
+        </p:spPr>
+      </p:pic>
     </p:spTree>
     <p:extLst>
       <p:ext uri="{BB962C8B-B14F-4D97-AF65-F5344CB8AC3E}">
-        <p14:creationId xmlns:p14="http://schemas.microsoft.com/office/powerpoint/2010/main" val="3813364566"/>
+        <p14:creationId xmlns:p14="http://schemas.microsoft.com/office/powerpoint/2010/main" val="1865829788"/>
       </p:ext>
     </p:extLst>
   </p:cSld>
@@ -6380,7 +7047,7 @@
           <p:cNvPr id="2" name="Title 1">
             <a:extLst>
               <a:ext uri="{FF2B5EF4-FFF2-40B4-BE49-F238E27FC236}">
-                <a16:creationId xmlns:a16="http://schemas.microsoft.com/office/drawing/2014/main" id="{416DD996-624E-45ED-8EED-6A5E8616292C}"/>
+                <a16:creationId xmlns:a16="http://schemas.microsoft.com/office/drawing/2014/main" id="{0BDDB62F-6244-4C11-8A3B-3324AED7E99A}"/>
               </a:ext>
             </a:extLst>
           </p:cNvPr>
@@ -6396,10 +7063,7 @@
           <a:bodyPr/>
           <a:lstStyle/>
           <a:p>
-            <a:r>
-              <a:rPr lang="en-US" dirty="0"/>
-              <a:t>Step Six – pull updates to ‘local’</a:t>
-            </a:r>
+            <a:endParaRPr lang="en-US"/>
           </a:p>
         </p:txBody>
       </p:sp>
@@ -6408,7 +7072,7 @@
           <p:cNvPr id="3" name="Content Placeholder 2">
             <a:extLst>
               <a:ext uri="{FF2B5EF4-FFF2-40B4-BE49-F238E27FC236}">
-                <a16:creationId xmlns:a16="http://schemas.microsoft.com/office/drawing/2014/main" id="{7EE4F517-C702-4C74-B0D3-77DAD4E18DEA}"/>
+                <a16:creationId xmlns:a16="http://schemas.microsoft.com/office/drawing/2014/main" id="{93522BC1-DF0A-47EF-8C58-D5D51BD5B935}"/>
               </a:ext>
             </a:extLst>
           </p:cNvPr>
@@ -6424,60 +7088,14 @@
           <a:bodyPr/>
           <a:lstStyle/>
           <a:p>
-            <a:endParaRPr lang="en-US" dirty="0"/>
-          </a:p>
-          <a:p>
-            <a:r>
-              <a:rPr lang="en-US" dirty="0"/>
-              <a:t>git pull origin master</a:t>
-            </a:r>
-          </a:p>
-          <a:p>
-            <a:pPr lvl="1"/>
-            <a:r>
-              <a:rPr lang="en-US" dirty="0"/>
-              <a:t>Fetch any changes and merge them with your local copy</a:t>
-            </a:r>
-          </a:p>
-          <a:p>
-            <a:endParaRPr lang="en-US" dirty="0"/>
-          </a:p>
-          <a:p>
-            <a:r>
-              <a:rPr lang="en-US" dirty="0"/>
-              <a:t>Conflicting changes can cause warnings to pop up</a:t>
-            </a:r>
-          </a:p>
-          <a:p>
-            <a:pPr lvl="1"/>
-            <a:r>
-              <a:rPr lang="en-US" dirty="0"/>
-              <a:t>shouldn’t happen often if you always save to </a:t>
-            </a:r>
-            <a:r>
-              <a:rPr lang="en-US" dirty="0" err="1"/>
-              <a:t>Github</a:t>
-            </a:r>
-            <a:r>
-              <a:rPr lang="en-US" dirty="0"/>
-              <a:t> </a:t>
-            </a:r>
-          </a:p>
-          <a:p>
-            <a:endParaRPr lang="en-US" dirty="0"/>
-          </a:p>
-          <a:p>
-            <a:r>
-              <a:rPr lang="en-US" dirty="0"/>
-              <a:t>I’ll let you google how to fix things from there</a:t>
-            </a:r>
+            <a:endParaRPr lang="en-US"/>
           </a:p>
         </p:txBody>
       </p:sp>
     </p:spTree>
     <p:extLst>
       <p:ext uri="{BB962C8B-B14F-4D97-AF65-F5344CB8AC3E}">
-        <p14:creationId xmlns:p14="http://schemas.microsoft.com/office/powerpoint/2010/main" val="172910440"/>
+        <p14:creationId xmlns:p14="http://schemas.microsoft.com/office/powerpoint/2010/main" val="1723058546"/>
       </p:ext>
     </p:extLst>
   </p:cSld>
@@ -6506,10 +7124,10 @@
       </p:grpSpPr>
       <p:sp>
         <p:nvSpPr>
-          <p:cNvPr id="2" name="Title 1">
+          <p:cNvPr id="4" name="Text Placeholder 3">
             <a:extLst>
               <a:ext uri="{FF2B5EF4-FFF2-40B4-BE49-F238E27FC236}">
-                <a16:creationId xmlns:a16="http://schemas.microsoft.com/office/drawing/2014/main" id="{EC626170-3C40-46CD-9452-1878CD911335}"/>
+                <a16:creationId xmlns:a16="http://schemas.microsoft.com/office/drawing/2014/main" id="{9D49BA7D-C6CE-4A4F-A900-3D17C646CA29}"/>
               </a:ext>
             </a:extLst>
           </p:cNvPr>
@@ -6517,19 +7135,17 @@
             <a:spLocks noGrp="1"/>
           </p:cNvSpPr>
           <p:nvPr>
-            <p:ph type="title"/>
+            <p:ph type="body" idx="1"/>
           </p:nvPr>
         </p:nvSpPr>
         <p:spPr/>
         <p:txBody>
-          <a:bodyPr>
-            <a:normAutofit fontScale="90000"/>
-          </a:bodyPr>
-          <a:lstStyle/>
-          <a:p>
-            <a:r>
-              <a:rPr lang="en-US" dirty="0"/>
-              <a:t>Step Seven – sync with original fork</a:t>
+          <a:bodyPr/>
+          <a:lstStyle/>
+          <a:p>
+            <a:r>
+              <a:rPr lang="en-US" dirty="0"/>
+              <a:t>This course</a:t>
             </a:r>
           </a:p>
         </p:txBody>
@@ -6539,7 +7155,7 @@
           <p:cNvPr id="3" name="Content Placeholder 2">
             <a:extLst>
               <a:ext uri="{FF2B5EF4-FFF2-40B4-BE49-F238E27FC236}">
-                <a16:creationId xmlns:a16="http://schemas.microsoft.com/office/drawing/2014/main" id="{97997E6A-AFF0-4BE5-BA8B-8145692DAD96}"/>
+                <a16:creationId xmlns:a16="http://schemas.microsoft.com/office/drawing/2014/main" id="{635665DD-8C05-4E7F-874B-B1AF1EBA6CFB}"/>
               </a:ext>
             </a:extLst>
           </p:cNvPr>
@@ -6547,248 +7163,142 @@
             <a:spLocks noGrp="1"/>
           </p:cNvSpPr>
           <p:nvPr>
-            <p:ph idx="1"/>
+            <p:ph sz="half" idx="2"/>
           </p:nvPr>
         </p:nvSpPr>
         <p:spPr/>
         <p:txBody>
-          <a:bodyPr>
-            <a:normAutofit fontScale="92500" lnSpcReduction="10000"/>
-          </a:bodyPr>
-          <a:lstStyle/>
-          <a:p>
-            <a:r>
-              <a:rPr lang="en-US" dirty="0"/>
-              <a:t>As we add new files to the class repo you’ll want to add those to your forked copy</a:t>
-            </a:r>
-          </a:p>
-          <a:p>
-            <a:r>
-              <a:rPr lang="en-US" dirty="0"/>
-              <a:t>Remember how git saved your repo URL as ‘origin’?</a:t>
-            </a:r>
-          </a:p>
-          <a:p>
-            <a:r>
-              <a:rPr lang="en-US" dirty="0"/>
-              <a:t>We need to add the class repo URL as ‘upstream’ with:</a:t>
-            </a:r>
+          <a:bodyPr/>
+          <a:lstStyle/>
+          <a:p>
+            <a:r>
+              <a:rPr lang="en-US" dirty="0"/>
+              <a:t>A (</a:t>
+            </a:r>
+            <a:r>
+              <a:rPr lang="en-US" dirty="0" err="1"/>
+              <a:t>patho</a:t>
+            </a:r>
+            <a:r>
+              <a:rPr lang="en-US" dirty="0"/>
+              <a:t>)biology course</a:t>
+            </a:r>
+          </a:p>
+          <a:p>
+            <a:r>
+              <a:rPr lang="en-US" dirty="0"/>
+              <a:t>Coding familiarity</a:t>
+            </a:r>
+          </a:p>
+          <a:p>
+            <a:r>
+              <a:rPr lang="en-US" dirty="0"/>
+              <a:t>Sampling of tools</a:t>
+            </a:r>
+          </a:p>
+          <a:p>
+            <a:r>
+              <a:rPr lang="en-US" u="sng" dirty="0"/>
+              <a:t>One</a:t>
+            </a:r>
+            <a:r>
+              <a:rPr lang="en-US" dirty="0"/>
+              <a:t> way to approach problems</a:t>
+            </a:r>
+            <a:endParaRPr lang="en-US" u="sng" dirty="0"/>
           </a:p>
           <a:p>
             <a:pPr lvl="1"/>
-            <a:r>
-              <a:rPr lang="en-US" dirty="0"/>
-              <a:t>git remote add upstream &lt;class repo URL&gt;</a:t>
-            </a:r>
-          </a:p>
-          <a:p>
-            <a:r>
-              <a:rPr lang="en-US" dirty="0"/>
-              <a:t>Navigate to the top folder</a:t>
-            </a:r>
-          </a:p>
-          <a:p>
-            <a:pPr lvl="1"/>
-            <a:r>
-              <a:rPr lang="en-US" dirty="0"/>
-              <a:t>git fetch upstream</a:t>
-            </a:r>
-          </a:p>
-          <a:p>
-            <a:pPr lvl="1"/>
-            <a:r>
-              <a:rPr lang="en-US" dirty="0"/>
-              <a:t>git checkout master</a:t>
-            </a:r>
-          </a:p>
-          <a:p>
-            <a:pPr lvl="1"/>
-            <a:r>
-              <a:rPr lang="en-US" dirty="0"/>
-              <a:t>git merge checkout/master</a:t>
-            </a:r>
-          </a:p>
-          <a:p>
-            <a:r>
-              <a:rPr lang="en-US" dirty="0"/>
-              <a:t>Save all that to your </a:t>
-            </a:r>
-            <a:r>
-              <a:rPr lang="en-US" dirty="0" err="1"/>
-              <a:t>Github</a:t>
-            </a:r>
-            <a:r>
-              <a:rPr lang="en-US" dirty="0"/>
-              <a:t> repo</a:t>
-            </a:r>
-          </a:p>
-          <a:p>
-            <a:pPr lvl="1"/>
-            <a:r>
-              <a:rPr lang="en-US" dirty="0"/>
-              <a:t>git push origin master</a:t>
-            </a:r>
+            <a:endParaRPr lang="en-US" dirty="0"/>
+          </a:p>
+        </p:txBody>
+      </p:sp>
+      <p:sp>
+        <p:nvSpPr>
+          <p:cNvPr id="5" name="Text Placeholder 4">
+            <a:extLst>
+              <a:ext uri="{FF2B5EF4-FFF2-40B4-BE49-F238E27FC236}">
+                <a16:creationId xmlns:a16="http://schemas.microsoft.com/office/drawing/2014/main" id="{2DD83A1A-2D00-4F3C-83D1-F953C26970E2}"/>
+              </a:ext>
+            </a:extLst>
+          </p:cNvPr>
+          <p:cNvSpPr>
+            <a:spLocks noGrp="1"/>
+          </p:cNvSpPr>
+          <p:nvPr>
+            <p:ph type="body" sz="quarter" idx="3"/>
+          </p:nvPr>
+        </p:nvSpPr>
+        <p:spPr/>
+        <p:txBody>
+          <a:bodyPr/>
+          <a:lstStyle/>
+          <a:p>
+            <a:r>
+              <a:rPr lang="en-US" dirty="0"/>
+              <a:t>This course is NOT</a:t>
+            </a:r>
+          </a:p>
+        </p:txBody>
+      </p:sp>
+      <p:sp>
+        <p:nvSpPr>
+          <p:cNvPr id="6" name="Content Placeholder 5">
+            <a:extLst>
+              <a:ext uri="{FF2B5EF4-FFF2-40B4-BE49-F238E27FC236}">
+                <a16:creationId xmlns:a16="http://schemas.microsoft.com/office/drawing/2014/main" id="{27E9A025-33C0-45B7-A851-A4D49E6B474B}"/>
+              </a:ext>
+            </a:extLst>
+          </p:cNvPr>
+          <p:cNvSpPr>
+            <a:spLocks noGrp="1"/>
+          </p:cNvSpPr>
+          <p:nvPr>
+            <p:ph sz="quarter" idx="4"/>
+          </p:nvPr>
+        </p:nvSpPr>
+        <p:spPr/>
+        <p:txBody>
+          <a:bodyPr/>
+          <a:lstStyle/>
+          <a:p>
+            <a:r>
+              <a:rPr lang="en-US" dirty="0"/>
+              <a:t>A computer science course</a:t>
+            </a:r>
+          </a:p>
+          <a:p>
+            <a:r>
+              <a:rPr lang="en-US" dirty="0"/>
+              <a:t>Full coding comprehension</a:t>
+            </a:r>
+          </a:p>
+          <a:p>
+            <a:r>
+              <a:rPr lang="en-US" dirty="0"/>
+              <a:t>Comprehensive survey</a:t>
+            </a:r>
+          </a:p>
+          <a:p>
+            <a:r>
+              <a:rPr lang="en-US" u="sng" dirty="0"/>
+              <a:t>The</a:t>
+            </a:r>
+            <a:r>
+              <a:rPr lang="en-US" dirty="0"/>
+              <a:t> way to approach problems</a:t>
+            </a:r>
+            <a:endParaRPr lang="en-US" u="sng" dirty="0"/>
+          </a:p>
+          <a:p>
+            <a:endParaRPr lang="en-US" dirty="0"/>
           </a:p>
         </p:txBody>
       </p:sp>
     </p:spTree>
     <p:extLst>
       <p:ext uri="{BB962C8B-B14F-4D97-AF65-F5344CB8AC3E}">
-        <p14:creationId xmlns:p14="http://schemas.microsoft.com/office/powerpoint/2010/main" val="882964213"/>
-      </p:ext>
-    </p:extLst>
-  </p:cSld>
-  <p:clrMapOvr>
-    <a:masterClrMapping/>
-  </p:clrMapOvr>
-</p:sld>
-</file>
-
-<file path=ppt/slides/slide14.xml><?xml version="1.0" encoding="utf-8"?>
-<p:sld xmlns:a="http://schemas.openxmlformats.org/drawingml/2006/main" xmlns:r="http://schemas.openxmlformats.org/officeDocument/2006/relationships" xmlns:p="http://schemas.openxmlformats.org/presentationml/2006/main">
-  <p:cSld>
-    <p:spTree>
-      <p:nvGrpSpPr>
-        <p:cNvPr id="1" name=""/>
-        <p:cNvGrpSpPr/>
-        <p:nvPr/>
-      </p:nvGrpSpPr>
-      <p:grpSpPr>
-        <a:xfrm>
-          <a:off x="0" y="0"/>
-          <a:ext cx="0" cy="0"/>
-          <a:chOff x="0" y="0"/>
-          <a:chExt cx="0" cy="0"/>
-        </a:xfrm>
-      </p:grpSpPr>
-      <p:sp>
-        <p:nvSpPr>
-          <p:cNvPr id="2" name="Title 1">
-            <a:extLst>
-              <a:ext uri="{FF2B5EF4-FFF2-40B4-BE49-F238E27FC236}">
-                <a16:creationId xmlns:a16="http://schemas.microsoft.com/office/drawing/2014/main" id="{FC88C787-6AA4-46C2-B2CE-A7DF386C7406}"/>
-              </a:ext>
-            </a:extLst>
-          </p:cNvPr>
-          <p:cNvSpPr>
-            <a:spLocks noGrp="1"/>
-          </p:cNvSpPr>
-          <p:nvPr>
-            <p:ph type="title"/>
-          </p:nvPr>
-        </p:nvSpPr>
-        <p:spPr/>
-        <p:txBody>
-          <a:bodyPr/>
-          <a:lstStyle/>
-          <a:p>
-            <a:r>
-              <a:rPr lang="en-US" dirty="0"/>
-              <a:t>git commands for this class</a:t>
-            </a:r>
-          </a:p>
-        </p:txBody>
-      </p:sp>
-      <p:sp>
-        <p:nvSpPr>
-          <p:cNvPr id="3" name="Content Placeholder 2">
-            <a:extLst>
-              <a:ext uri="{FF2B5EF4-FFF2-40B4-BE49-F238E27FC236}">
-                <a16:creationId xmlns:a16="http://schemas.microsoft.com/office/drawing/2014/main" id="{7E8A0B59-155B-4FD8-AD6A-144723C59FA2}"/>
-              </a:ext>
-            </a:extLst>
-          </p:cNvPr>
-          <p:cNvSpPr>
-            <a:spLocks noGrp="1"/>
-          </p:cNvSpPr>
-          <p:nvPr>
-            <p:ph idx="1"/>
-          </p:nvPr>
-        </p:nvSpPr>
-        <p:spPr/>
-        <p:txBody>
-          <a:bodyPr/>
-          <a:lstStyle/>
-          <a:p>
-            <a:endParaRPr lang="en-US" dirty="0"/>
-          </a:p>
-          <a:p>
-            <a:r>
-              <a:rPr lang="en-US" dirty="0">
-                <a:solidFill>
-                  <a:srgbClr val="FFFF00"/>
-                </a:solidFill>
-              </a:rPr>
-              <a:t>git </a:t>
-            </a:r>
-            <a:r>
-              <a:rPr lang="en-US" dirty="0" err="1">
-                <a:solidFill>
-                  <a:srgbClr val="FFFF00"/>
-                </a:solidFill>
-              </a:rPr>
-              <a:t>init</a:t>
-            </a:r>
-            <a:r>
-              <a:rPr lang="en-US" dirty="0">
-                <a:solidFill>
-                  <a:srgbClr val="FFFF00"/>
-                </a:solidFill>
-              </a:rPr>
-              <a:t> </a:t>
-            </a:r>
-            <a:r>
-              <a:rPr lang="en-US" dirty="0"/>
-              <a:t>– set up a new git folder</a:t>
-            </a:r>
-          </a:p>
-          <a:p>
-            <a:r>
-              <a:rPr lang="en-US" dirty="0">
-                <a:solidFill>
-                  <a:srgbClr val="FFFF00"/>
-                </a:solidFill>
-              </a:rPr>
-              <a:t>git clone </a:t>
-            </a:r>
-            <a:r>
-              <a:rPr lang="en-US" dirty="0"/>
-              <a:t>– copy a git repo to your local computer</a:t>
-            </a:r>
-          </a:p>
-          <a:p>
-            <a:r>
-              <a:rPr lang="en-US" dirty="0"/>
-              <a:t>git add – step one of saving your git files</a:t>
-            </a:r>
-          </a:p>
-          <a:p>
-            <a:r>
-              <a:rPr lang="en-US" dirty="0"/>
-              <a:t>git commit – step two</a:t>
-            </a:r>
-          </a:p>
-          <a:p>
-            <a:r>
-              <a:rPr lang="en-US" dirty="0"/>
-              <a:t>git pull – fetch remote updates and merge with local repo</a:t>
-            </a:r>
-          </a:p>
-          <a:p>
-            <a:r>
-              <a:rPr lang="en-US" dirty="0"/>
-              <a:t>git push – send local updates to a remote repo </a:t>
-            </a:r>
-          </a:p>
-          <a:p>
-            <a:endParaRPr lang="en-US" dirty="0"/>
-          </a:p>
-        </p:txBody>
-      </p:sp>
-    </p:spTree>
-    <p:extLst>
-      <p:ext uri="{BB962C8B-B14F-4D97-AF65-F5344CB8AC3E}">
-        <p14:creationId xmlns:p14="http://schemas.microsoft.com/office/powerpoint/2010/main" val="1416934774"/>
+        <p14:creationId xmlns:p14="http://schemas.microsoft.com/office/powerpoint/2010/main" val="3040032462"/>
       </p:ext>
     </p:extLst>
   </p:cSld>
@@ -6820,7 +7330,7 @@
           <p:cNvPr id="2" name="Title 1">
             <a:extLst>
               <a:ext uri="{FF2B5EF4-FFF2-40B4-BE49-F238E27FC236}">
-                <a16:creationId xmlns:a16="http://schemas.microsoft.com/office/drawing/2014/main" id="{CC2ECEFA-1AF0-4F40-9927-451B79F827DA}"/>
+                <a16:creationId xmlns:a16="http://schemas.microsoft.com/office/drawing/2014/main" id="{83E06947-EEE8-4258-B577-F95A968E7D89}"/>
               </a:ext>
             </a:extLst>
           </p:cNvPr>
@@ -6838,7 +7348,7 @@
           <a:p>
             <a:r>
               <a:rPr lang="en-US" dirty="0"/>
-              <a:t>What is git?</a:t>
+              <a:t>Welcome to Pabio536!</a:t>
             </a:r>
           </a:p>
         </p:txBody>
@@ -6848,7 +7358,7 @@
           <p:cNvPr id="3" name="Content Placeholder 2">
             <a:extLst>
               <a:ext uri="{FF2B5EF4-FFF2-40B4-BE49-F238E27FC236}">
-                <a16:creationId xmlns:a16="http://schemas.microsoft.com/office/drawing/2014/main" id="{F9CE06BC-41DD-4F48-B7E3-A30D473F3E11}"/>
+                <a16:creationId xmlns:a16="http://schemas.microsoft.com/office/drawing/2014/main" id="{9D9AD25A-16EF-43D9-B1E9-BDDCC37C78F5}"/>
               </a:ext>
             </a:extLst>
           </p:cNvPr>
@@ -6861,53 +7371,52 @@
         </p:nvSpPr>
         <p:spPr/>
         <p:txBody>
-          <a:bodyPr/>
-          <a:lstStyle/>
-          <a:p>
+          <a:bodyPr anchor="ctr"/>
+          <a:lstStyle/>
+          <a:p>
+            <a:r>
+              <a:rPr lang="en-US" dirty="0"/>
+              <a:t>Introductions</a:t>
+            </a:r>
+          </a:p>
+          <a:p>
+            <a:r>
+              <a:rPr lang="en-US" dirty="0"/>
+              <a:t>Structure</a:t>
+            </a:r>
+          </a:p>
+          <a:p>
+            <a:r>
+              <a:rPr lang="en-US" dirty="0"/>
+              <a:t>Goal</a:t>
+            </a:r>
+          </a:p>
+          <a:p>
+            <a:r>
+              <a:rPr lang="en-US" dirty="0"/>
+              <a:t>Intro to git and </a:t>
+            </a:r>
+            <a:r>
+              <a:rPr lang="en-US" dirty="0" err="1"/>
+              <a:t>Github</a:t>
+            </a:r>
             <a:endParaRPr lang="en-US" dirty="0"/>
           </a:p>
           <a:p>
             <a:r>
               <a:rPr lang="en-US" dirty="0"/>
-              <a:t>Version control software (VCS) helps you share and collaborate on creating code</a:t>
-            </a:r>
-          </a:p>
-          <a:p>
-            <a:r>
-              <a:rPr lang="en-US" dirty="0"/>
-              <a:t>Git is the most popular of many VCS</a:t>
+              <a:t>Download files for class using git</a:t>
             </a:r>
           </a:p>
           <a:p>
             <a:endParaRPr lang="en-US" dirty="0"/>
-          </a:p>
-          <a:p>
-            <a:r>
-              <a:rPr lang="en-US" dirty="0"/>
-              <a:t>Git has many features for tracking software versions…</a:t>
-            </a:r>
-          </a:p>
-          <a:p>
-            <a:r>
-              <a:rPr lang="en-US" dirty="0"/>
-              <a:t>Which we will not use for this class</a:t>
-            </a:r>
-          </a:p>
-          <a:p>
-            <a:endParaRPr lang="en-US" dirty="0"/>
-          </a:p>
-          <a:p>
-            <a:r>
-              <a:rPr lang="en-US" dirty="0"/>
-              <a:t>So…</a:t>
-            </a:r>
           </a:p>
         </p:txBody>
       </p:sp>
     </p:spTree>
     <p:extLst>
       <p:ext uri="{BB962C8B-B14F-4D97-AF65-F5344CB8AC3E}">
-        <p14:creationId xmlns:p14="http://schemas.microsoft.com/office/powerpoint/2010/main" val="1632396045"/>
+        <p14:creationId xmlns:p14="http://schemas.microsoft.com/office/powerpoint/2010/main" val="1558860394"/>
       </p:ext>
     </p:extLst>
   </p:cSld>
@@ -6939,7 +7448,7 @@
           <p:cNvPr id="2" name="Title 1">
             <a:extLst>
               <a:ext uri="{FF2B5EF4-FFF2-40B4-BE49-F238E27FC236}">
-                <a16:creationId xmlns:a16="http://schemas.microsoft.com/office/drawing/2014/main" id="{608D40F2-B69D-4FA0-9A47-33CCE197408B}"/>
+                <a16:creationId xmlns:a16="http://schemas.microsoft.com/office/drawing/2014/main" id="{2BFA4A21-5466-410C-B788-0E29CDC0C032}"/>
               </a:ext>
             </a:extLst>
           </p:cNvPr>
@@ -6957,7 +7466,7 @@
           <a:p>
             <a:r>
               <a:rPr lang="en-US" dirty="0"/>
-              <a:t>Why am I making you learn git?</a:t>
+              <a:t>Course structure</a:t>
             </a:r>
           </a:p>
         </p:txBody>
@@ -6967,7 +7476,7 @@
           <p:cNvPr id="3" name="Content Placeholder 2">
             <a:extLst>
               <a:ext uri="{FF2B5EF4-FFF2-40B4-BE49-F238E27FC236}">
-                <a16:creationId xmlns:a16="http://schemas.microsoft.com/office/drawing/2014/main" id="{405FF733-82B7-4FC3-8E6D-4F6B58FA2C3F}"/>
+                <a16:creationId xmlns:a16="http://schemas.microsoft.com/office/drawing/2014/main" id="{F5E12077-772A-4B10-B5C6-EB3A7CBB1F9E}"/>
               </a:ext>
             </a:extLst>
           </p:cNvPr>
@@ -6980,77 +7489,102 @@
         </p:nvSpPr>
         <p:spPr/>
         <p:txBody>
-          <a:bodyPr/>
-          <a:lstStyle/>
-          <a:p>
-            <a:pPr marL="494100" indent="-457200">
-              <a:buFont typeface="+mj-lt"/>
-              <a:buAutoNum type="arabicPeriod"/>
-            </a:pPr>
+          <a:bodyPr anchor="ctr"/>
+          <a:lstStyle/>
+          <a:p>
+            <a:r>
+              <a:rPr lang="en-US" dirty="0"/>
+              <a:t>Class meets MW from 10 to 11:20</a:t>
+            </a:r>
+          </a:p>
+          <a:p>
+            <a:r>
+              <a:rPr lang="en-US" dirty="0"/>
+              <a:t>Room is either </a:t>
+            </a:r>
+            <a:r>
+              <a:rPr lang="en-US" dirty="0">
+                <a:solidFill>
+                  <a:schemeClr val="bg1"/>
+                </a:solidFill>
+                <a:highlight>
+                  <a:srgbClr val="FFFF00"/>
+                </a:highlight>
+              </a:rPr>
+              <a:t>C123A (14)</a:t>
+            </a:r>
+            <a:r>
+              <a:rPr lang="en-US" dirty="0"/>
+              <a:t> or </a:t>
+            </a:r>
+            <a:r>
+              <a:rPr lang="en-US" dirty="0">
+                <a:solidFill>
+                  <a:schemeClr val="bg1"/>
+                </a:solidFill>
+                <a:highlight>
+                  <a:srgbClr val="00FFFF"/>
+                </a:highlight>
+              </a:rPr>
+              <a:t>E130A (6)</a:t>
+            </a:r>
+            <a:r>
+              <a:rPr lang="en-US" dirty="0">
+                <a:solidFill>
+                  <a:schemeClr val="bg1"/>
+                </a:solidFill>
+              </a:rPr>
+              <a:t> </a:t>
+            </a:r>
+          </a:p>
+          <a:p>
+            <a:r>
+              <a:rPr lang="en-US" dirty="0"/>
+              <a:t>Optional lecture then hands-on</a:t>
+            </a:r>
+          </a:p>
+          <a:p>
+            <a:r>
+              <a:rPr lang="en-US" dirty="0"/>
+              <a:t>Homework most classes</a:t>
+            </a:r>
+          </a:p>
+          <a:p>
+            <a:r>
+              <a:rPr lang="en-US" dirty="0"/>
+              <a:t>Grades based on:</a:t>
+            </a:r>
+          </a:p>
+          <a:p>
+            <a:pPr lvl="1"/>
+            <a:r>
+              <a:rPr lang="en-US" dirty="0"/>
+              <a:t>Participation: 	10%</a:t>
+            </a:r>
+          </a:p>
+          <a:p>
+            <a:pPr lvl="1"/>
+            <a:r>
+              <a:rPr lang="en-US" dirty="0"/>
+              <a:t>Homework:	70%</a:t>
+            </a:r>
+          </a:p>
+          <a:p>
+            <a:pPr lvl="1"/>
+            <a:r>
+              <a:rPr lang="en-US" dirty="0"/>
+              <a:t>Final project:	20%</a:t>
+            </a:r>
+          </a:p>
+          <a:p>
             <a:endParaRPr lang="en-US" dirty="0"/>
-          </a:p>
-          <a:p>
-            <a:pPr marL="494100" indent="-457200">
-              <a:buFont typeface="+mj-lt"/>
-              <a:buAutoNum type="arabicPeriod"/>
-            </a:pPr>
-            <a:endParaRPr lang="en-US" dirty="0"/>
-          </a:p>
-          <a:p>
-            <a:pPr marL="494100" indent="-457200">
-              <a:buFont typeface="+mj-lt"/>
-              <a:buAutoNum type="arabicPeriod"/>
-            </a:pPr>
-            <a:endParaRPr lang="en-US" dirty="0"/>
-          </a:p>
-          <a:p>
-            <a:pPr marL="494100" indent="-457200">
-              <a:buFont typeface="+mj-lt"/>
-              <a:buAutoNum type="arabicPeriod"/>
-            </a:pPr>
-            <a:r>
-              <a:rPr lang="en-US" dirty="0"/>
-              <a:t>It’s a convenient way to share class code</a:t>
-            </a:r>
-          </a:p>
-          <a:p>
-            <a:pPr marL="494100" indent="-457200">
-              <a:buFont typeface="+mj-lt"/>
-              <a:buAutoNum type="arabicPeriod"/>
-            </a:pPr>
-            <a:r>
-              <a:rPr lang="en-US" dirty="0"/>
-              <a:t>You will finish the class with your own library of code</a:t>
-            </a:r>
-          </a:p>
-          <a:p>
-            <a:pPr marL="494100" indent="-457200">
-              <a:buFont typeface="+mj-lt"/>
-              <a:buAutoNum type="arabicPeriod"/>
-            </a:pPr>
-            <a:r>
-              <a:rPr lang="en-US" dirty="0" err="1"/>
-              <a:t>Github</a:t>
-            </a:r>
-            <a:r>
-              <a:rPr lang="en-US" dirty="0"/>
-              <a:t> and </a:t>
-            </a:r>
-            <a:r>
-              <a:rPr lang="en-US" dirty="0" err="1"/>
-              <a:t>Bitlocker</a:t>
-            </a:r>
-            <a:r>
-              <a:rPr lang="en-US" dirty="0"/>
-              <a:t> use git</a:t>
-            </a:r>
           </a:p>
         </p:txBody>
       </p:sp>
     </p:spTree>
     <p:extLst>
       <p:ext uri="{BB962C8B-B14F-4D97-AF65-F5344CB8AC3E}">
-        <p14:creationId xmlns:p14="http://schemas.microsoft.com/office/powerpoint/2010/main" val="706210046"/>
+        <p14:creationId xmlns:p14="http://schemas.microsoft.com/office/powerpoint/2010/main" val="1856242313"/>
       </p:ext>
     </p:extLst>
   </p:cSld>
@@ -7082,7 +7616,7 @@
           <p:cNvPr id="2" name="Title 1">
             <a:extLst>
               <a:ext uri="{FF2B5EF4-FFF2-40B4-BE49-F238E27FC236}">
-                <a16:creationId xmlns:a16="http://schemas.microsoft.com/office/drawing/2014/main" id="{57BDE4FE-464A-4203-A765-8AB379F86717}"/>
+                <a16:creationId xmlns:a16="http://schemas.microsoft.com/office/drawing/2014/main" id="{0EBFE3F9-EF84-46CD-AAF0-1D2488F0D319}"/>
               </a:ext>
             </a:extLst>
           </p:cNvPr>
@@ -7099,10 +7633,9 @@
           <a:lstStyle/>
           <a:p>
             <a:r>
-              <a:rPr lang="en-US" dirty="0" err="1"/>
-              <a:t>Github</a:t>
-            </a:r>
-            <a:endParaRPr lang="en-US" dirty="0"/>
+              <a:rPr lang="en-US" dirty="0"/>
+              <a:t>Course sections</a:t>
+            </a:r>
           </a:p>
         </p:txBody>
       </p:sp>
@@ -7111,7 +7644,7 @@
           <p:cNvPr id="3" name="Content Placeholder 2">
             <a:extLst>
               <a:ext uri="{FF2B5EF4-FFF2-40B4-BE49-F238E27FC236}">
-                <a16:creationId xmlns:a16="http://schemas.microsoft.com/office/drawing/2014/main" id="{ADF1471B-E89F-4D48-BD3B-03C88906B3A4}"/>
+                <a16:creationId xmlns:a16="http://schemas.microsoft.com/office/drawing/2014/main" id="{D1FBD597-70A1-4A3F-9BF0-8E4D4C976AA2}"/>
               </a:ext>
             </a:extLst>
           </p:cNvPr>
@@ -7124,96 +7657,77 @@
         </p:nvSpPr>
         <p:spPr/>
         <p:txBody>
-          <a:bodyPr>
-            <a:normAutofit fontScale="92500" lnSpcReduction="20000"/>
-          </a:bodyPr>
-          <a:lstStyle/>
-          <a:p>
-            <a:r>
-              <a:rPr lang="en-US" dirty="0" err="1"/>
-              <a:t>Github</a:t>
-            </a:r>
-            <a:r>
-              <a:rPr lang="en-US" dirty="0"/>
-              <a:t> is site for storing, sharing, and writing code using git to track versions</a:t>
-            </a:r>
-          </a:p>
-          <a:p>
-            <a:r>
-              <a:rPr lang="en-US" dirty="0"/>
-              <a:t>28 million current repositories</a:t>
-            </a:r>
-          </a:p>
-          <a:p>
-            <a:r>
-              <a:rPr lang="en-US" dirty="0"/>
-              <a:t>Software from thousands of papers is freely available on </a:t>
-            </a:r>
-            <a:r>
-              <a:rPr lang="en-US" dirty="0" err="1"/>
-              <a:t>Github</a:t>
-            </a:r>
-            <a:endParaRPr lang="en-US" dirty="0"/>
-          </a:p>
-          <a:p>
-            <a:endParaRPr lang="en-US" dirty="0"/>
-          </a:p>
-          <a:p>
-            <a:r>
-              <a:rPr lang="en-US" dirty="0"/>
-              <a:t>By the end of this class series I want you to be able to:</a:t>
-            </a:r>
-          </a:p>
-          <a:p>
-            <a:pPr lvl="1"/>
-            <a:r>
-              <a:rPr lang="en-US" dirty="0"/>
-              <a:t>Read a paper describing an interesting analysis method</a:t>
-            </a:r>
-          </a:p>
-          <a:p>
-            <a:pPr lvl="1"/>
-            <a:r>
-              <a:rPr lang="en-US" dirty="0"/>
-              <a:t>Get that software off </a:t>
-            </a:r>
-            <a:r>
-              <a:rPr lang="en-US" dirty="0" err="1"/>
-              <a:t>Github</a:t>
-            </a:r>
-            <a:endParaRPr lang="en-US" dirty="0"/>
-          </a:p>
-          <a:p>
-            <a:pPr lvl="1"/>
-            <a:r>
-              <a:rPr lang="en-US" dirty="0"/>
-              <a:t>Understand the basic function of that code and have a reasonable chance at running it yourself </a:t>
-            </a:r>
-          </a:p>
-          <a:p>
-            <a:pPr lvl="1"/>
-            <a:endParaRPr lang="en-US" dirty="0"/>
-          </a:p>
-          <a:p>
-            <a:r>
-              <a:rPr lang="en-US" dirty="0"/>
-              <a:t>If you don’t have one, go ahead and create a </a:t>
-            </a:r>
-            <a:r>
-              <a:rPr lang="en-US" dirty="0" err="1"/>
-              <a:t>Github</a:t>
-            </a:r>
-            <a:r>
-              <a:rPr lang="en-US" dirty="0"/>
-              <a:t> account now</a:t>
-            </a:r>
+          <a:bodyPr/>
+          <a:lstStyle/>
+          <a:p>
+            <a:pPr marL="1152900" lvl="2" indent="-342900">
+              <a:buFont typeface="+mj-lt"/>
+              <a:buAutoNum type="arabicPeriod"/>
+            </a:pPr>
+            <a:r>
+              <a:rPr lang="en-US" sz="2000" dirty="0">
+                <a:effectLst/>
+              </a:rPr>
+              <a:t>Python as a bioinformatic tool</a:t>
+            </a:r>
+          </a:p>
+          <a:p>
+            <a:pPr marL="1152900" lvl="2" indent="-342900">
+              <a:buFont typeface="+mj-lt"/>
+              <a:buAutoNum type="arabicPeriod"/>
+            </a:pPr>
+            <a:r>
+              <a:rPr lang="en-US" sz="2000" dirty="0">
+                <a:effectLst/>
+              </a:rPr>
+              <a:t>Tools for nucleic acid analysis </a:t>
+            </a:r>
+          </a:p>
+          <a:p>
+            <a:pPr marL="1152900" lvl="2" indent="-342900">
+              <a:buFont typeface="+mj-lt"/>
+              <a:buAutoNum type="arabicPeriod"/>
+            </a:pPr>
+            <a:r>
+              <a:rPr lang="en-US" sz="2000" dirty="0">
+                <a:effectLst/>
+              </a:rPr>
+              <a:t> Networks to visualize and analyze biological data</a:t>
+            </a:r>
+          </a:p>
+          <a:p>
+            <a:pPr marL="1152900" lvl="2" indent="-342900">
+              <a:buFont typeface="+mj-lt"/>
+              <a:buAutoNum type="arabicPeriod"/>
+            </a:pPr>
+            <a:r>
+              <a:rPr lang="en-US" sz="2000" dirty="0">
+                <a:effectLst/>
+              </a:rPr>
+              <a:t>Protein structure and function analysis </a:t>
+            </a:r>
+          </a:p>
+          <a:p>
+            <a:pPr marL="1152900" lvl="2" indent="-342900">
+              <a:buFont typeface="+mj-lt"/>
+              <a:buAutoNum type="arabicPeriod"/>
+            </a:pPr>
+            <a:r>
+              <a:rPr lang="en-US" sz="2000" dirty="0">
+                <a:effectLst/>
+              </a:rPr>
+              <a:t>Independent final project</a:t>
+            </a:r>
+            <a:endParaRPr lang="en-US" dirty="0">
+              <a:effectLst/>
+            </a:endParaRPr>
           </a:p>
         </p:txBody>
       </p:sp>
     </p:spTree>
     <p:extLst>
       <p:ext uri="{BB962C8B-B14F-4D97-AF65-F5344CB8AC3E}">
-        <p14:creationId xmlns:p14="http://schemas.microsoft.com/office/powerpoint/2010/main" val="2604073691"/>
+        <p14:creationId xmlns:p14="http://schemas.microsoft.com/office/powerpoint/2010/main" val="629959176"/>
       </p:ext>
     </p:extLst>
   </p:cSld>
@@ -7245,7 +7759,7 @@
           <p:cNvPr id="2" name="Title 1">
             <a:extLst>
               <a:ext uri="{FF2B5EF4-FFF2-40B4-BE49-F238E27FC236}">
-                <a16:creationId xmlns:a16="http://schemas.microsoft.com/office/drawing/2014/main" id="{FC88C787-6AA4-46C2-B2CE-A7DF386C7406}"/>
+                <a16:creationId xmlns:a16="http://schemas.microsoft.com/office/drawing/2014/main" id="{F70FD47B-2CE8-45CC-93B1-375B0769E8EA}"/>
               </a:ext>
             </a:extLst>
           </p:cNvPr>
@@ -7263,7 +7777,7 @@
           <a:p>
             <a:r>
               <a:rPr lang="en-US" dirty="0"/>
-              <a:t>git commands for this class</a:t>
+              <a:t>Class goals</a:t>
             </a:r>
           </a:p>
         </p:txBody>
@@ -7273,7 +7787,7 @@
           <p:cNvPr id="3" name="Content Placeholder 2">
             <a:extLst>
               <a:ext uri="{FF2B5EF4-FFF2-40B4-BE49-F238E27FC236}">
-                <a16:creationId xmlns:a16="http://schemas.microsoft.com/office/drawing/2014/main" id="{7E8A0B59-155B-4FD8-AD6A-144723C59FA2}"/>
+                <a16:creationId xmlns:a16="http://schemas.microsoft.com/office/drawing/2014/main" id="{916038EE-7A89-4281-A843-11DC86F742DC}"/>
               </a:ext>
             </a:extLst>
           </p:cNvPr>
@@ -7284,55 +7798,71 @@
             <p:ph idx="1"/>
           </p:nvPr>
         </p:nvSpPr>
-        <p:spPr/>
-        <p:txBody>
-          <a:bodyPr/>
-          <a:lstStyle/>
+        <p:spPr>
+          <a:xfrm>
+            <a:off x="685346" y="1732450"/>
+            <a:ext cx="7122913" cy="4058751"/>
+          </a:xfrm>
+        </p:spPr>
+        <p:txBody>
+          <a:bodyPr>
+            <a:noAutofit/>
+          </a:bodyPr>
+          <a:lstStyle/>
+          <a:p>
+            <a:r>
+              <a:rPr lang="en-US" dirty="0"/>
+              <a:t>Comprehension of python</a:t>
+            </a:r>
+          </a:p>
+          <a:p>
+            <a:r>
+              <a:rPr lang="en-US" dirty="0"/>
+              <a:t>Introduce a range of free software tools</a:t>
+            </a:r>
+          </a:p>
+          <a:p>
+            <a:r>
+              <a:rPr lang="en-US" dirty="0"/>
+              <a:t>Build your personal data analysis toolkit</a:t>
+            </a:r>
+          </a:p>
           <a:p>
             <a:endParaRPr lang="en-US" dirty="0"/>
           </a:p>
           <a:p>
             <a:r>
               <a:rPr lang="en-US" dirty="0"/>
-              <a:t>git </a:t>
-            </a:r>
-            <a:r>
-              <a:rPr lang="en-US" dirty="0" err="1"/>
-              <a:t>init</a:t>
-            </a:r>
-            <a:r>
-              <a:rPr lang="en-US" dirty="0"/>
-              <a:t> – set up a new git folder</a:t>
-            </a:r>
-          </a:p>
-          <a:p>
-            <a:r>
-              <a:rPr lang="en-US" dirty="0"/>
-              <a:t>git clone – copy a git repo to your local computer</a:t>
-            </a:r>
-          </a:p>
-          <a:p>
-            <a:r>
-              <a:rPr lang="en-US" dirty="0"/>
-              <a:t>git add – step one of saving your git files</a:t>
-            </a:r>
-          </a:p>
-          <a:p>
-            <a:r>
-              <a:rPr lang="en-US" dirty="0"/>
-              <a:t>git commit – step two</a:t>
-            </a:r>
-          </a:p>
-          <a:p>
-            <a:r>
-              <a:rPr lang="en-US" dirty="0"/>
-              <a:t>git pull – fetch updates and merge them with local copy</a:t>
-            </a:r>
-          </a:p>
-          <a:p>
-            <a:r>
-              <a:rPr lang="en-US" dirty="0"/>
-              <a:t>git push – send updates </a:t>
+              <a:t>By the end of this course, be able to: </a:t>
+            </a:r>
+          </a:p>
+          <a:p>
+            <a:pPr lvl="1"/>
+            <a:r>
+              <a:rPr lang="en-US" dirty="0"/>
+              <a:t>Read and understand papers describing code for data analysis</a:t>
+            </a:r>
+          </a:p>
+          <a:p>
+            <a:pPr lvl="1"/>
+            <a:r>
+              <a:rPr lang="en-US" dirty="0"/>
+              <a:t>Add software to your toolkit</a:t>
+            </a:r>
+          </a:p>
+          <a:p>
+            <a:pPr lvl="1"/>
+            <a:r>
+              <a:rPr lang="en-US" dirty="0"/>
+              <a:t>Use toolkit with </a:t>
+            </a:r>
+            <a:r>
+              <a:rPr lang="en-US" u="sng" dirty="0"/>
+              <a:t>your</a:t>
+            </a:r>
+            <a:r>
+              <a:rPr lang="en-US" dirty="0"/>
+              <a:t> data</a:t>
             </a:r>
           </a:p>
           <a:p>
@@ -7341,15 +7871,19 @@
           <a:p>
             <a:r>
               <a:rPr lang="en-US" dirty="0"/>
-              <a:t>I’ll also touch on branch, merge, and a few others</a:t>
-            </a:r>
+              <a:t>Quick demo</a:t>
+            </a:r>
+          </a:p>
+          <a:p>
+            <a:pPr lvl="1"/>
+            <a:endParaRPr lang="en-US" dirty="0"/>
           </a:p>
         </p:txBody>
       </p:sp>
     </p:spTree>
     <p:extLst>
       <p:ext uri="{BB962C8B-B14F-4D97-AF65-F5344CB8AC3E}">
-        <p14:creationId xmlns:p14="http://schemas.microsoft.com/office/powerpoint/2010/main" val="4138857148"/>
+        <p14:creationId xmlns:p14="http://schemas.microsoft.com/office/powerpoint/2010/main" val="3594643732"/>
       </p:ext>
     </p:extLst>
   </p:cSld>
@@ -7378,10 +7912,10 @@
       </p:grpSpPr>
       <p:sp>
         <p:nvSpPr>
-          <p:cNvPr id="2" name="Title 1">
+          <p:cNvPr id="4" name="Title 3">
             <a:extLst>
               <a:ext uri="{FF2B5EF4-FFF2-40B4-BE49-F238E27FC236}">
-                <a16:creationId xmlns:a16="http://schemas.microsoft.com/office/drawing/2014/main" id="{FC608F0B-0C93-4F91-AFB0-A3B29A654DC7}"/>
+                <a16:creationId xmlns:a16="http://schemas.microsoft.com/office/drawing/2014/main" id="{083B418C-969B-49FF-A14E-A886534E7038}"/>
               </a:ext>
             </a:extLst>
           </p:cNvPr>
@@ -7399,11 +7933,11 @@
           <a:p>
             <a:r>
               <a:rPr lang="en-US" dirty="0"/>
-              <a:t>Step One – git </a:t>
+              <a:t>Git and </a:t>
             </a:r>
             <a:r>
               <a:rPr lang="en-US" dirty="0" err="1"/>
-              <a:t>init</a:t>
+              <a:t>Github</a:t>
             </a:r>
             <a:endParaRPr lang="en-US" dirty="0"/>
           </a:p>
@@ -7411,10 +7945,10 @@
       </p:sp>
       <p:sp>
         <p:nvSpPr>
-          <p:cNvPr id="3" name="Content Placeholder 2">
+          <p:cNvPr id="5" name="Text Placeholder 4">
             <a:extLst>
               <a:ext uri="{FF2B5EF4-FFF2-40B4-BE49-F238E27FC236}">
-                <a16:creationId xmlns:a16="http://schemas.microsoft.com/office/drawing/2014/main" id="{F40107AA-FDE2-45D0-952D-D8AA8C041998}"/>
+                <a16:creationId xmlns:a16="http://schemas.microsoft.com/office/drawing/2014/main" id="{FF0DCEDD-8559-4701-9AC2-9DD5B1D4D908}"/>
               </a:ext>
             </a:extLst>
           </p:cNvPr>
@@ -7422,7 +7956,7 @@
             <a:spLocks noGrp="1"/>
           </p:cNvSpPr>
           <p:nvPr>
-            <p:ph idx="1"/>
+            <p:ph type="body" idx="1"/>
           </p:nvPr>
         </p:nvSpPr>
         <p:spPr/>
@@ -7430,61 +7964,14 @@
           <a:bodyPr/>
           <a:lstStyle/>
           <a:p>
-            <a:endParaRPr lang="en-US" dirty="0"/>
-          </a:p>
-          <a:p>
-            <a:r>
-              <a:rPr lang="en-US" dirty="0"/>
-              <a:t>Make a new folder for holding your repositories</a:t>
-            </a:r>
-          </a:p>
-          <a:p>
-            <a:endParaRPr lang="en-US" dirty="0"/>
-          </a:p>
-          <a:p>
-            <a:r>
-              <a:rPr lang="en-US" dirty="0"/>
-              <a:t>Open git bash (win) or terminal (mac) in this folder</a:t>
-            </a:r>
-          </a:p>
-          <a:p>
-            <a:endParaRPr lang="en-US" dirty="0"/>
-          </a:p>
-          <a:p>
-            <a:r>
-              <a:rPr lang="en-US" dirty="0"/>
-              <a:t>Type : git </a:t>
-            </a:r>
-            <a:r>
-              <a:rPr lang="en-US" dirty="0" err="1"/>
-              <a:t>init</a:t>
-            </a:r>
-            <a:r>
-              <a:rPr lang="en-US" dirty="0"/>
-              <a:t> pabio536</a:t>
-            </a:r>
-          </a:p>
-          <a:p>
-            <a:endParaRPr lang="en-US" dirty="0"/>
-          </a:p>
-          <a:p>
-            <a:r>
-              <a:rPr lang="en-US" dirty="0"/>
-              <a:t>Move to the newly created ‘pabio536’ folder</a:t>
-            </a:r>
-          </a:p>
-          <a:p>
-            <a:pPr marL="36900" indent="0">
-              <a:buNone/>
-            </a:pPr>
-            <a:endParaRPr lang="en-US" dirty="0"/>
+            <a:endParaRPr lang="en-US"/>
           </a:p>
         </p:txBody>
       </p:sp>
     </p:spTree>
     <p:extLst>
       <p:ext uri="{BB962C8B-B14F-4D97-AF65-F5344CB8AC3E}">
-        <p14:creationId xmlns:p14="http://schemas.microsoft.com/office/powerpoint/2010/main" val="38463761"/>
+        <p14:creationId xmlns:p14="http://schemas.microsoft.com/office/powerpoint/2010/main" val="288813505"/>
       </p:ext>
     </p:extLst>
   </p:cSld>
@@ -7516,7 +8003,7 @@
           <p:cNvPr id="2" name="Title 1">
             <a:extLst>
               <a:ext uri="{FF2B5EF4-FFF2-40B4-BE49-F238E27FC236}">
-                <a16:creationId xmlns:a16="http://schemas.microsoft.com/office/drawing/2014/main" id="{D400C865-0914-4BD5-A773-3CC9EEDFDE5C}"/>
+                <a16:creationId xmlns:a16="http://schemas.microsoft.com/office/drawing/2014/main" id="{608D40F2-B69D-4FA0-9A47-33CCE197408B}"/>
               </a:ext>
             </a:extLst>
           </p:cNvPr>
@@ -7529,12 +8016,14 @@
         </p:nvSpPr>
         <p:spPr/>
         <p:txBody>
-          <a:bodyPr/>
-          <a:lstStyle/>
-          <a:p>
-            <a:r>
-              <a:rPr lang="en-US" dirty="0"/>
-              <a:t>Step Two – fork and git clone</a:t>
+          <a:bodyPr>
+            <a:normAutofit fontScale="90000"/>
+          </a:bodyPr>
+          <a:lstStyle/>
+          <a:p>
+            <a:r>
+              <a:rPr lang="en-US" dirty="0"/>
+              <a:t>What is git and why am I making you use it?</a:t>
             </a:r>
           </a:p>
         </p:txBody>
@@ -7544,7 +8033,7 @@
           <p:cNvPr id="3" name="Content Placeholder 2">
             <a:extLst>
               <a:ext uri="{FF2B5EF4-FFF2-40B4-BE49-F238E27FC236}">
-                <a16:creationId xmlns:a16="http://schemas.microsoft.com/office/drawing/2014/main" id="{3A41FB11-AB76-437F-94FD-2990AFD44AEE}"/>
+                <a16:creationId xmlns:a16="http://schemas.microsoft.com/office/drawing/2014/main" id="{405FF733-82B7-4FC3-8E6D-4F6B58FA2C3F}"/>
               </a:ext>
             </a:extLst>
           </p:cNvPr>
@@ -7557,111 +8046,117 @@
         </p:nvSpPr>
         <p:spPr/>
         <p:txBody>
-          <a:bodyPr>
-            <a:normAutofit lnSpcReduction="10000"/>
+          <a:bodyPr anchor="ctr">
+            <a:normAutofit/>
           </a:bodyPr>
           <a:lstStyle/>
           <a:p>
-            <a:r>
-              <a:rPr lang="en-US" dirty="0"/>
-              <a:t>Go to the class </a:t>
+            <a:pPr marL="494100" indent="-457200">
+              <a:buFont typeface="+mj-lt"/>
+              <a:buAutoNum type="arabicPeriod"/>
+            </a:pPr>
+            <a:r>
+              <a:rPr lang="en-US" dirty="0"/>
+              <a:t>Git is version control software for repositories (repos)</a:t>
+            </a:r>
+          </a:p>
+          <a:p>
+            <a:pPr marL="871200" lvl="1" indent="-457200"/>
+            <a:r>
+              <a:rPr lang="en-US" dirty="0"/>
+              <a:t>Repo: A folder full of files + tracking ALL changes</a:t>
+            </a:r>
+          </a:p>
+          <a:p>
+            <a:pPr marL="494100" indent="-457200">
+              <a:buFont typeface="+mj-lt"/>
+              <a:buAutoNum type="arabicPeriod"/>
+            </a:pPr>
+            <a:endParaRPr lang="en-US" dirty="0"/>
+          </a:p>
+          <a:p>
+            <a:pPr marL="494100" indent="-457200">
+              <a:buFont typeface="+mj-lt"/>
+              <a:buAutoNum type="arabicPeriod"/>
+            </a:pPr>
+            <a:r>
+              <a:rPr lang="en-US" dirty="0"/>
+              <a:t>Convenient way to share class code</a:t>
+            </a:r>
+          </a:p>
+          <a:p>
+            <a:pPr marL="871200" lvl="1" indent="-457200"/>
+            <a:r>
+              <a:rPr lang="en-US" dirty="0">
+                <a:solidFill>
+                  <a:schemeClr val="accent4"/>
+                </a:solidFill>
+              </a:rPr>
+              <a:t>Class</a:t>
+            </a:r>
+            <a:r>
+              <a:rPr lang="en-US" dirty="0"/>
+              <a:t> repo &gt;&gt; your </a:t>
+            </a:r>
+            <a:r>
+              <a:rPr lang="en-US" dirty="0">
+                <a:solidFill>
+                  <a:schemeClr val="accent1"/>
+                </a:solidFill>
+              </a:rPr>
+              <a:t>remote</a:t>
+            </a:r>
+            <a:r>
+              <a:rPr lang="en-US" dirty="0"/>
+              <a:t> repo &gt;&gt; your </a:t>
+            </a:r>
+            <a:r>
+              <a:rPr lang="en-US" dirty="0">
+                <a:solidFill>
+                  <a:schemeClr val="accent2"/>
+                </a:solidFill>
+              </a:rPr>
+              <a:t>local</a:t>
+            </a:r>
+            <a:r>
+              <a:rPr lang="en-US" dirty="0"/>
+              <a:t> repo</a:t>
+            </a:r>
+          </a:p>
+          <a:p>
+            <a:pPr marL="494100" indent="-457200">
+              <a:buFont typeface="+mj-lt"/>
+              <a:buAutoNum type="arabicPeriod"/>
+            </a:pPr>
+            <a:r>
+              <a:rPr lang="en-US" dirty="0"/>
+              <a:t>Free tools on </a:t>
             </a:r>
             <a:r>
               <a:rPr lang="en-US" dirty="0" err="1"/>
-              <a:t>github</a:t>
-            </a:r>
-            <a:r>
-              <a:rPr lang="en-US" dirty="0"/>
-              <a:t> repository:</a:t>
-            </a:r>
-          </a:p>
-          <a:p>
-            <a:pPr lvl="1"/>
-            <a:r>
-              <a:rPr lang="en-US" dirty="0">
-                <a:hlinkClick r:id="rId2"/>
-              </a:rPr>
-              <a:t>https://github.com/trustad/Pabio536</a:t>
-            </a:r>
-            <a:endParaRPr lang="en-US" dirty="0"/>
-          </a:p>
-          <a:p>
-            <a:r>
-              <a:rPr lang="en-US" dirty="0"/>
-              <a:t>‘Fork’ a copy to your own repo</a:t>
-            </a:r>
-          </a:p>
-          <a:p>
-            <a:r>
-              <a:rPr lang="en-US" dirty="0"/>
-              <a:t>Click on the green ‘Clone or Download’ button</a:t>
-            </a:r>
-          </a:p>
-          <a:p>
-            <a:r>
-              <a:rPr lang="en-US" dirty="0"/>
-              <a:t>Copy the URL</a:t>
-            </a:r>
-          </a:p>
-          <a:p>
-            <a:endParaRPr lang="en-US" dirty="0"/>
-          </a:p>
-          <a:p>
-            <a:r>
-              <a:rPr lang="en-US" dirty="0"/>
-              <a:t>Back to git bash</a:t>
-            </a:r>
-          </a:p>
-          <a:p>
-            <a:r>
-              <a:rPr lang="en-US" dirty="0"/>
-              <a:t>Type : git clone &lt;paste here&gt;</a:t>
-            </a:r>
-          </a:p>
-          <a:p>
-            <a:endParaRPr lang="en-US" dirty="0"/>
-          </a:p>
-          <a:p>
-            <a:r>
-              <a:rPr lang="en-US" dirty="0"/>
-              <a:t>Check out downloaded files</a:t>
-            </a:r>
-          </a:p>
-        </p:txBody>
-      </p:sp>
-      <p:pic>
-        <p:nvPicPr>
-          <p:cNvPr id="4" name="Picture 3">
-            <a:extLst>
-              <a:ext uri="{FF2B5EF4-FFF2-40B4-BE49-F238E27FC236}">
-                <a16:creationId xmlns:a16="http://schemas.microsoft.com/office/drawing/2014/main" id="{456C6F7A-E1C6-4EDC-A71A-F7ED9E944E16}"/>
-              </a:ext>
-            </a:extLst>
-          </p:cNvPr>
-          <p:cNvPicPr>
-            <a:picLocks noChangeAspect="1"/>
-          </p:cNvPicPr>
-          <p:nvPr/>
-        </p:nvPicPr>
-        <p:blipFill rotWithShape="1">
-          <a:blip r:embed="rId3"/>
-          <a:srcRect l="11078" t="17900" r="12157"/>
-          <a:stretch/>
-        </p:blipFill>
-        <p:spPr>
-          <a:xfrm>
-            <a:off x="4737974" y="3092822"/>
-            <a:ext cx="4235695" cy="3272119"/>
-          </a:xfrm>
-          <a:prstGeom prst="rect">
-            <a:avLst/>
-          </a:prstGeom>
-        </p:spPr>
-      </p:pic>
+              <a:t>Github</a:t>
+            </a:r>
+            <a:r>
+              <a:rPr lang="en-US" dirty="0"/>
+              <a:t> and Bitbucket</a:t>
+            </a:r>
+          </a:p>
+          <a:p>
+            <a:pPr marL="494100" indent="-457200">
+              <a:buFont typeface="+mj-lt"/>
+              <a:buAutoNum type="arabicPeriod"/>
+            </a:pPr>
+            <a:r>
+              <a:rPr lang="en-US" dirty="0"/>
+              <a:t>Place to store your toolkit</a:t>
+            </a:r>
+          </a:p>
+        </p:txBody>
+      </p:sp>
     </p:spTree>
     <p:extLst>
       <p:ext uri="{BB962C8B-B14F-4D97-AF65-F5344CB8AC3E}">
-        <p14:creationId xmlns:p14="http://schemas.microsoft.com/office/powerpoint/2010/main" val="1865829788"/>
+        <p14:creationId xmlns:p14="http://schemas.microsoft.com/office/powerpoint/2010/main" val="706210046"/>
       </p:ext>
     </p:extLst>
   </p:cSld>
@@ -7693,7 +8188,7 @@
           <p:cNvPr id="2" name="Title 1">
             <a:extLst>
               <a:ext uri="{FF2B5EF4-FFF2-40B4-BE49-F238E27FC236}">
-                <a16:creationId xmlns:a16="http://schemas.microsoft.com/office/drawing/2014/main" id="{20335539-DBA2-4C88-9CBE-657830929AAA}"/>
+                <a16:creationId xmlns:a16="http://schemas.microsoft.com/office/drawing/2014/main" id="{D400C865-0914-4BD5-A773-3CC9EEDFDE5C}"/>
               </a:ext>
             </a:extLst>
           </p:cNvPr>
@@ -7706,12 +8201,14 @@
         </p:nvSpPr>
         <p:spPr/>
         <p:txBody>
-          <a:bodyPr/>
-          <a:lstStyle/>
-          <a:p>
-            <a:r>
-              <a:rPr lang="en-US" dirty="0"/>
-              <a:t>Step Three – git add and commit</a:t>
+          <a:bodyPr>
+            <a:normAutofit/>
+          </a:bodyPr>
+          <a:lstStyle/>
+          <a:p>
+            <a:r>
+              <a:rPr lang="en-US" dirty="0"/>
+              <a:t>1. Fork a copy &gt;&gt; remote repo</a:t>
             </a:r>
           </a:p>
         </p:txBody>
@@ -7721,7 +8218,7 @@
           <p:cNvPr id="3" name="Content Placeholder 2">
             <a:extLst>
               <a:ext uri="{FF2B5EF4-FFF2-40B4-BE49-F238E27FC236}">
-                <a16:creationId xmlns:a16="http://schemas.microsoft.com/office/drawing/2014/main" id="{87ECEAB9-D2B4-4778-BDC2-A82B65A34509}"/>
+                <a16:creationId xmlns:a16="http://schemas.microsoft.com/office/drawing/2014/main" id="{3A41FB11-AB76-437F-94FD-2990AFD44AEE}"/>
               </a:ext>
             </a:extLst>
           </p:cNvPr>
@@ -7735,107 +8232,294 @@
         <p:spPr/>
         <p:txBody>
           <a:bodyPr>
-            <a:normAutofit fontScale="85000" lnSpcReduction="10000"/>
+            <a:normAutofit/>
           </a:bodyPr>
           <a:lstStyle/>
           <a:p>
             <a:r>
               <a:rPr lang="en-US" dirty="0"/>
-              <a:t>Open a text editor, type your name, and save that file in a new folder in your pabio536 repo named ‘</a:t>
-            </a:r>
-            <a:r>
-              <a:rPr lang="en-US" dirty="0" err="1"/>
-              <a:t>LastNameFirstInitial</a:t>
-            </a:r>
-            <a:r>
-              <a:rPr lang="en-US" dirty="0"/>
-              <a:t>’ </a:t>
-            </a:r>
-          </a:p>
-          <a:p>
-            <a:r>
-              <a:rPr lang="en-US" dirty="0"/>
-              <a:t>Back to the git bash</a:t>
-            </a:r>
-          </a:p>
-          <a:p>
-            <a:r>
-              <a:rPr lang="en-US" dirty="0"/>
-              <a:t>git add and commit essentially save changes in two steps</a:t>
-            </a:r>
+              <a:t>Go to </a:t>
+            </a:r>
+            <a:r>
+              <a:rPr lang="en-US" dirty="0">
+                <a:hlinkClick r:id="rId2"/>
+              </a:rPr>
+              <a:t>https://github.com/trustad/Pabio536</a:t>
+            </a:r>
+            <a:endParaRPr lang="en-US" dirty="0"/>
           </a:p>
           <a:p>
             <a:pPr lvl="1"/>
             <a:r>
               <a:rPr lang="en-US" dirty="0"/>
-              <a:t>add determines which changes will be saved</a:t>
-            </a:r>
-          </a:p>
-          <a:p>
-            <a:pPr lvl="1"/>
-            <a:r>
-              <a:rPr lang="en-US" dirty="0"/>
-              <a:t>commit saves those changes </a:t>
-            </a:r>
-          </a:p>
-          <a:p>
-            <a:r>
-              <a:rPr lang="en-US" dirty="0"/>
-              <a:t>Type : git add .</a:t>
-            </a:r>
-          </a:p>
-          <a:p>
-            <a:pPr lvl="1"/>
-            <a:r>
-              <a:rPr lang="en-US" dirty="0"/>
-              <a:t>That period at the end is important</a:t>
-            </a:r>
-          </a:p>
-          <a:p>
-            <a:pPr lvl="1"/>
-            <a:r>
-              <a:rPr lang="en-US" dirty="0"/>
-              <a:t>Those </a:t>
-            </a:r>
-            <a:r>
-              <a:rPr lang="en-US"/>
-              <a:t>error messages aren’t</a:t>
-            </a:r>
-            <a:endParaRPr lang="en-US" dirty="0"/>
-          </a:p>
-          <a:p>
-            <a:r>
-              <a:rPr lang="en-US" dirty="0"/>
-              <a:t>Now enter : git commit –m ‘New test file’</a:t>
-            </a:r>
-          </a:p>
-          <a:p>
-            <a:pPr lvl="1"/>
-            <a:r>
-              <a:rPr lang="en-US" dirty="0"/>
-              <a:t>If you leave out the –m “New… part a text editor opens </a:t>
-            </a:r>
-          </a:p>
-          <a:p>
-            <a:pPr lvl="1"/>
-            <a:r>
-              <a:rPr lang="en-US" dirty="0"/>
-              <a:t>This can be a less than friendly experience. Use –m.</a:t>
-            </a:r>
-          </a:p>
-          <a:p>
-            <a:pPr lvl="1"/>
-            <a:endParaRPr lang="en-US" dirty="0"/>
-          </a:p>
-          <a:p>
-            <a:endParaRPr lang="en-US" dirty="0"/>
+              <a:t>This is the class repository, or repo</a:t>
+            </a:r>
+          </a:p>
+          <a:p>
+            <a:pPr marL="494100" indent="-457200">
+              <a:buFont typeface="+mj-lt"/>
+              <a:buAutoNum type="arabicPeriod"/>
+            </a:pPr>
+            <a:r>
+              <a:rPr lang="en-US" dirty="0"/>
+              <a:t>Fork a copy</a:t>
+            </a:r>
+          </a:p>
+          <a:p>
+            <a:pPr marL="494100" indent="-457200">
+              <a:buFont typeface="+mj-lt"/>
+              <a:buAutoNum type="arabicPeriod"/>
+            </a:pPr>
+            <a:r>
+              <a:rPr lang="en-US" dirty="0"/>
+              <a:t>Get the web address (URL) of </a:t>
+            </a:r>
+            <a:r>
+              <a:rPr lang="en-US" u="sng" dirty="0"/>
+              <a:t>your</a:t>
+            </a:r>
+            <a:r>
+              <a:rPr lang="en-US" dirty="0"/>
+              <a:t> copy</a:t>
+            </a:r>
+          </a:p>
+        </p:txBody>
+      </p:sp>
+      <p:pic>
+        <p:nvPicPr>
+          <p:cNvPr id="4" name="Picture 3">
+            <a:extLst>
+              <a:ext uri="{FF2B5EF4-FFF2-40B4-BE49-F238E27FC236}">
+                <a16:creationId xmlns:a16="http://schemas.microsoft.com/office/drawing/2014/main" id="{456C6F7A-E1C6-4EDC-A71A-F7ED9E944E16}"/>
+              </a:ext>
+            </a:extLst>
+          </p:cNvPr>
+          <p:cNvPicPr>
+            <a:picLocks noChangeAspect="1"/>
+          </p:cNvPicPr>
+          <p:nvPr/>
+        </p:nvPicPr>
+        <p:blipFill rotWithShape="1">
+          <a:blip r:embed="rId3"/>
+          <a:srcRect l="11078" t="17900" r="12157" b="33290"/>
+          <a:stretch/>
+        </p:blipFill>
+        <p:spPr>
+          <a:xfrm>
+            <a:off x="1205880" y="3621737"/>
+            <a:ext cx="6246185" cy="2868708"/>
+          </a:xfrm>
+          <a:prstGeom prst="rect">
+            <a:avLst/>
+          </a:prstGeom>
+        </p:spPr>
+      </p:pic>
+      <p:sp>
+        <p:nvSpPr>
+          <p:cNvPr id="5" name="TextBox 4">
+            <a:extLst>
+              <a:ext uri="{FF2B5EF4-FFF2-40B4-BE49-F238E27FC236}">
+                <a16:creationId xmlns:a16="http://schemas.microsoft.com/office/drawing/2014/main" id="{B25105A1-D59E-457C-B4DC-FC87FD62EC3E}"/>
+              </a:ext>
+            </a:extLst>
+          </p:cNvPr>
+          <p:cNvSpPr txBox="1"/>
+          <p:nvPr/>
+        </p:nvSpPr>
+        <p:spPr>
+          <a:xfrm>
+            <a:off x="6786281" y="3037250"/>
+            <a:ext cx="403411" cy="369332"/>
+          </a:xfrm>
+          <a:prstGeom prst="rect">
+            <a:avLst/>
+          </a:prstGeom>
+        </p:spPr>
+        <p:style>
+          <a:lnRef idx="2">
+            <a:schemeClr val="accent2">
+              <a:shade val="50000"/>
+            </a:schemeClr>
+          </a:lnRef>
+          <a:fillRef idx="1">
+            <a:schemeClr val="accent2"/>
+          </a:fillRef>
+          <a:effectRef idx="0">
+            <a:schemeClr val="accent2"/>
+          </a:effectRef>
+          <a:fontRef idx="minor">
+            <a:schemeClr val="lt1"/>
+          </a:fontRef>
+        </p:style>
+        <p:txBody>
+          <a:bodyPr wrap="square" rtlCol="0">
+            <a:spAutoFit/>
+          </a:bodyPr>
+          <a:lstStyle/>
+          <a:p>
+            <a:pPr algn="ctr"/>
+            <a:r>
+              <a:rPr lang="en-US" dirty="0">
+                <a:solidFill>
+                  <a:schemeClr val="bg1"/>
+                </a:solidFill>
+              </a:rPr>
+              <a:t>1</a:t>
+            </a:r>
+          </a:p>
+        </p:txBody>
+      </p:sp>
+      <p:sp>
+        <p:nvSpPr>
+          <p:cNvPr id="6" name="TextBox 5">
+            <a:extLst>
+              <a:ext uri="{FF2B5EF4-FFF2-40B4-BE49-F238E27FC236}">
+                <a16:creationId xmlns:a16="http://schemas.microsoft.com/office/drawing/2014/main" id="{C4661126-82F3-4E25-8161-B56BEBEA412E}"/>
+              </a:ext>
+            </a:extLst>
+          </p:cNvPr>
+          <p:cNvSpPr txBox="1"/>
+          <p:nvPr/>
+        </p:nvSpPr>
+        <p:spPr>
+          <a:xfrm>
+            <a:off x="7633121" y="5143958"/>
+            <a:ext cx="403411" cy="369332"/>
+          </a:xfrm>
+          <a:prstGeom prst="rect">
+            <a:avLst/>
+          </a:prstGeom>
+        </p:spPr>
+        <p:style>
+          <a:lnRef idx="2">
+            <a:schemeClr val="accent2">
+              <a:shade val="50000"/>
+            </a:schemeClr>
+          </a:lnRef>
+          <a:fillRef idx="1">
+            <a:schemeClr val="accent2"/>
+          </a:fillRef>
+          <a:effectRef idx="0">
+            <a:schemeClr val="accent2"/>
+          </a:effectRef>
+          <a:fontRef idx="minor">
+            <a:schemeClr val="lt1"/>
+          </a:fontRef>
+        </p:style>
+        <p:txBody>
+          <a:bodyPr wrap="square" rtlCol="0">
+            <a:spAutoFit/>
+          </a:bodyPr>
+          <a:lstStyle/>
+          <a:p>
+            <a:pPr algn="ctr"/>
+            <a:r>
+              <a:rPr lang="en-US" dirty="0">
+                <a:solidFill>
+                  <a:schemeClr val="bg1"/>
+                </a:solidFill>
+              </a:rPr>
+              <a:t>2</a:t>
+            </a:r>
+          </a:p>
+        </p:txBody>
+      </p:sp>
+      <p:sp>
+        <p:nvSpPr>
+          <p:cNvPr id="7" name="Arrow: Right 6">
+            <a:extLst>
+              <a:ext uri="{FF2B5EF4-FFF2-40B4-BE49-F238E27FC236}">
+                <a16:creationId xmlns:a16="http://schemas.microsoft.com/office/drawing/2014/main" id="{2D825B28-9208-4F43-A361-CA55702E1054}"/>
+              </a:ext>
+            </a:extLst>
+          </p:cNvPr>
+          <p:cNvSpPr/>
+          <p:nvPr/>
+        </p:nvSpPr>
+        <p:spPr>
+          <a:xfrm rot="5400000">
+            <a:off x="6844550" y="3405692"/>
+            <a:ext cx="286870" cy="297615"/>
+          </a:xfrm>
+          <a:prstGeom prst="rightArrow">
+            <a:avLst/>
+          </a:prstGeom>
+        </p:spPr>
+        <p:style>
+          <a:lnRef idx="2">
+            <a:schemeClr val="accent2">
+              <a:shade val="50000"/>
+            </a:schemeClr>
+          </a:lnRef>
+          <a:fillRef idx="1">
+            <a:schemeClr val="accent2"/>
+          </a:fillRef>
+          <a:effectRef idx="0">
+            <a:schemeClr val="accent2"/>
+          </a:effectRef>
+          <a:fontRef idx="minor">
+            <a:schemeClr val="lt1"/>
+          </a:fontRef>
+        </p:style>
+        <p:txBody>
+          <a:bodyPr rtlCol="0" anchor="ctr"/>
+          <a:lstStyle/>
+          <a:p>
+            <a:pPr algn="ctr"/>
+            <a:endParaRPr lang="en-US"/>
+          </a:p>
+        </p:txBody>
+      </p:sp>
+      <p:sp>
+        <p:nvSpPr>
+          <p:cNvPr id="8" name="Arrow: Right 7">
+            <a:extLst>
+              <a:ext uri="{FF2B5EF4-FFF2-40B4-BE49-F238E27FC236}">
+                <a16:creationId xmlns:a16="http://schemas.microsoft.com/office/drawing/2014/main" id="{BA767DC2-F888-459C-AD98-89DD0152A6BC}"/>
+              </a:ext>
+            </a:extLst>
+          </p:cNvPr>
+          <p:cNvSpPr/>
+          <p:nvPr/>
+        </p:nvSpPr>
+        <p:spPr>
+          <a:xfrm rot="10800000">
+            <a:off x="7346251" y="5179816"/>
+            <a:ext cx="286870" cy="297615"/>
+          </a:xfrm>
+          <a:prstGeom prst="rightArrow">
+            <a:avLst/>
+          </a:prstGeom>
+        </p:spPr>
+        <p:style>
+          <a:lnRef idx="2">
+            <a:schemeClr val="accent2">
+              <a:shade val="50000"/>
+            </a:schemeClr>
+          </a:lnRef>
+          <a:fillRef idx="1">
+            <a:schemeClr val="accent2"/>
+          </a:fillRef>
+          <a:effectRef idx="0">
+            <a:schemeClr val="accent2"/>
+          </a:effectRef>
+          <a:fontRef idx="minor">
+            <a:schemeClr val="lt1"/>
+          </a:fontRef>
+        </p:style>
+        <p:txBody>
+          <a:bodyPr rtlCol="0" anchor="ctr"/>
+          <a:lstStyle/>
+          <a:p>
+            <a:pPr algn="ctr"/>
+            <a:endParaRPr lang="en-US"/>
           </a:p>
         </p:txBody>
       </p:sp>
     </p:spTree>
     <p:extLst>
       <p:ext uri="{BB962C8B-B14F-4D97-AF65-F5344CB8AC3E}">
-        <p14:creationId xmlns:p14="http://schemas.microsoft.com/office/powerpoint/2010/main" val="1287166054"/>
+        <p14:creationId xmlns:p14="http://schemas.microsoft.com/office/powerpoint/2010/main" val="4152623797"/>
       </p:ext>
     </p:extLst>
   </p:cSld>
@@ -7867,7 +8551,7 @@
           <p:cNvPr id="2" name="Title 1">
             <a:extLst>
               <a:ext uri="{FF2B5EF4-FFF2-40B4-BE49-F238E27FC236}">
-                <a16:creationId xmlns:a16="http://schemas.microsoft.com/office/drawing/2014/main" id="{3BD74F38-7C36-4755-B8E1-34523F8D74C4}"/>
+                <a16:creationId xmlns:a16="http://schemas.microsoft.com/office/drawing/2014/main" id="{D400C865-0914-4BD5-A773-3CC9EEDFDE5C}"/>
               </a:ext>
             </a:extLst>
           </p:cNvPr>
@@ -7885,7 +8569,35 @@
           <a:p>
             <a:r>
               <a:rPr lang="en-US" dirty="0"/>
-              <a:t>A quick detour into git branch </a:t>
+              <a:t>2. Open git Bash or terminal</a:t>
+            </a:r>
+          </a:p>
+        </p:txBody>
+      </p:sp>
+      <p:sp>
+        <p:nvSpPr>
+          <p:cNvPr id="6" name="Text Placeholder 5">
+            <a:extLst>
+              <a:ext uri="{FF2B5EF4-FFF2-40B4-BE49-F238E27FC236}">
+                <a16:creationId xmlns:a16="http://schemas.microsoft.com/office/drawing/2014/main" id="{4844947B-0E0D-4859-A1C6-E9EF8D974460}"/>
+              </a:ext>
+            </a:extLst>
+          </p:cNvPr>
+          <p:cNvSpPr>
+            <a:spLocks noGrp="1"/>
+          </p:cNvSpPr>
+          <p:nvPr>
+            <p:ph type="body" idx="1"/>
+          </p:nvPr>
+        </p:nvSpPr>
+        <p:spPr/>
+        <p:txBody>
+          <a:bodyPr/>
+          <a:lstStyle/>
+          <a:p>
+            <a:r>
+              <a:rPr lang="en-US" dirty="0"/>
+              <a:t>Windows</a:t>
             </a:r>
           </a:p>
         </p:txBody>
@@ -7895,7 +8607,7 @@
           <p:cNvPr id="3" name="Content Placeholder 2">
             <a:extLst>
               <a:ext uri="{FF2B5EF4-FFF2-40B4-BE49-F238E27FC236}">
-                <a16:creationId xmlns:a16="http://schemas.microsoft.com/office/drawing/2014/main" id="{2D41B92D-6500-4055-9A63-94F4EE23B4F9}"/>
+                <a16:creationId xmlns:a16="http://schemas.microsoft.com/office/drawing/2014/main" id="{3A41FB11-AB76-437F-94FD-2990AFD44AEE}"/>
               </a:ext>
             </a:extLst>
           </p:cNvPr>
@@ -7903,59 +8615,112 @@
             <a:spLocks noGrp="1"/>
           </p:cNvSpPr>
           <p:nvPr>
-            <p:ph idx="1"/>
+            <p:ph sz="half" idx="2"/>
           </p:nvPr>
         </p:nvSpPr>
         <p:spPr/>
         <p:txBody>
+          <a:bodyPr>
+            <a:normAutofit/>
+          </a:bodyPr>
+          <a:lstStyle/>
+          <a:p>
+            <a:r>
+              <a:rPr lang="en-US" dirty="0"/>
+              <a:t>Open git bash</a:t>
+            </a:r>
+          </a:p>
+        </p:txBody>
+      </p:sp>
+      <p:sp>
+        <p:nvSpPr>
+          <p:cNvPr id="7" name="Text Placeholder 6">
+            <a:extLst>
+              <a:ext uri="{FF2B5EF4-FFF2-40B4-BE49-F238E27FC236}">
+                <a16:creationId xmlns:a16="http://schemas.microsoft.com/office/drawing/2014/main" id="{8CD72FFC-3EE6-4290-8D8C-1D54589D62E7}"/>
+              </a:ext>
+            </a:extLst>
+          </p:cNvPr>
+          <p:cNvSpPr>
+            <a:spLocks noGrp="1"/>
+          </p:cNvSpPr>
+          <p:nvPr>
+            <p:ph type="body" sz="quarter" idx="3"/>
+          </p:nvPr>
+        </p:nvSpPr>
+        <p:spPr/>
+        <p:txBody>
           <a:bodyPr/>
           <a:lstStyle/>
           <a:p>
             <a:r>
               <a:rPr lang="en-US" dirty="0"/>
-              <a:t>Everything done so far was on the ‘master’ branch</a:t>
-            </a:r>
-          </a:p>
-          <a:p>
-            <a:r>
-              <a:rPr lang="en-US" dirty="0"/>
-              <a:t>You can make a new branch, say ‘local’ with the command:</a:t>
-            </a:r>
-          </a:p>
-          <a:p>
-            <a:pPr lvl="1"/>
-            <a:r>
-              <a:rPr lang="en-US" dirty="0"/>
-              <a:t> git branch ‘local’</a:t>
-            </a:r>
-          </a:p>
-          <a:p>
-            <a:r>
-              <a:rPr lang="en-US" dirty="0"/>
-              <a:t>This is the functional equivalent of saving your repo folders under a new name</a:t>
-            </a:r>
-          </a:p>
-          <a:p>
-            <a:r>
-              <a:rPr lang="en-US" dirty="0"/>
-              <a:t>Changes to ‘master’ won’t change ‘local’ … until you want them</a:t>
-            </a:r>
-          </a:p>
-          <a:p>
-            <a:endParaRPr lang="en-US" dirty="0"/>
-          </a:p>
-          <a:p>
-            <a:r>
-              <a:rPr lang="en-US" dirty="0"/>
-              <a:t>We won’t use branch in this class, but if you want to try it out, go for it, and I’m happy to answer questions.</a:t>
-            </a:r>
-          </a:p>
-        </p:txBody>
-      </p:sp>
+              <a:t>Mac</a:t>
+            </a:r>
+          </a:p>
+        </p:txBody>
+      </p:sp>
+      <p:sp>
+        <p:nvSpPr>
+          <p:cNvPr id="8" name="Content Placeholder 7">
+            <a:extLst>
+              <a:ext uri="{FF2B5EF4-FFF2-40B4-BE49-F238E27FC236}">
+                <a16:creationId xmlns:a16="http://schemas.microsoft.com/office/drawing/2014/main" id="{F170CC43-C220-4504-8C9C-097CE8169310}"/>
+              </a:ext>
+            </a:extLst>
+          </p:cNvPr>
+          <p:cNvSpPr>
+            <a:spLocks noGrp="1"/>
+          </p:cNvSpPr>
+          <p:nvPr>
+            <p:ph sz="quarter" idx="4"/>
+          </p:nvPr>
+        </p:nvSpPr>
+        <p:spPr/>
+        <p:txBody>
+          <a:bodyPr/>
+          <a:lstStyle/>
+          <a:p>
+            <a:r>
+              <a:rPr lang="en-US" dirty="0"/>
+              <a:t>Open terminal</a:t>
+            </a:r>
+          </a:p>
+        </p:txBody>
+      </p:sp>
+      <p:pic>
+        <p:nvPicPr>
+          <p:cNvPr id="9" name="Picture 8">
+            <a:extLst>
+              <a:ext uri="{FF2B5EF4-FFF2-40B4-BE49-F238E27FC236}">
+                <a16:creationId xmlns:a16="http://schemas.microsoft.com/office/drawing/2014/main" id="{9AF9C311-CBF3-4365-9B2C-5DC06D40BCE9}"/>
+              </a:ext>
+            </a:extLst>
+          </p:cNvPr>
+          <p:cNvPicPr>
+            <a:picLocks noChangeAspect="1"/>
+          </p:cNvPicPr>
+          <p:nvPr/>
+        </p:nvPicPr>
+        <p:blipFill rotWithShape="1">
+          <a:blip r:embed="rId2"/>
+          <a:srcRect l="38039" t="12789" r="27549" b="23246"/>
+          <a:stretch/>
+        </p:blipFill>
+        <p:spPr>
+          <a:xfrm>
+            <a:off x="838249" y="2806513"/>
+            <a:ext cx="3489567" cy="3648636"/>
+          </a:xfrm>
+          <a:prstGeom prst="rect">
+            <a:avLst/>
+          </a:prstGeom>
+        </p:spPr>
+      </p:pic>
     </p:spTree>
     <p:extLst>
       <p:ext uri="{BB962C8B-B14F-4D97-AF65-F5344CB8AC3E}">
-        <p14:creationId xmlns:p14="http://schemas.microsoft.com/office/powerpoint/2010/main" val="2351919102"/>
+        <p14:creationId xmlns:p14="http://schemas.microsoft.com/office/powerpoint/2010/main" val="1921983555"/>
       </p:ext>
     </p:extLst>
   </p:cSld>
@@ -8205,4 +8970,299 @@
     </a:ext>
   </a:extLst>
 </a:theme>
+</file>
+
+<file path=ppt/theme/theme2.xml><?xml version="1.0" encoding="utf-8"?>
+<a:theme xmlns:a="http://schemas.openxmlformats.org/drawingml/2006/main" name="Office Theme">
+  <a:themeElements>
+    <a:clrScheme name="Office">
+      <a:dk1>
+        <a:sysClr val="windowText" lastClr="000000"/>
+      </a:dk1>
+      <a:lt1>
+        <a:sysClr val="window" lastClr="FFFFFF"/>
+      </a:lt1>
+      <a:dk2>
+        <a:srgbClr val="44546A"/>
+      </a:dk2>
+      <a:lt2>
+        <a:srgbClr val="E7E6E6"/>
+      </a:lt2>
+      <a:accent1>
+        <a:srgbClr val="4472C4"/>
+      </a:accent1>
+      <a:accent2>
+        <a:srgbClr val="ED7D31"/>
+      </a:accent2>
+      <a:accent3>
+        <a:srgbClr val="A5A5A5"/>
+      </a:accent3>
+      <a:accent4>
+        <a:srgbClr val="FFC000"/>
+      </a:accent4>
+      <a:accent5>
+        <a:srgbClr val="5B9BD5"/>
+      </a:accent5>
+      <a:accent6>
+        <a:srgbClr val="70AD47"/>
+      </a:accent6>
+      <a:hlink>
+        <a:srgbClr val="0563C1"/>
+      </a:hlink>
+      <a:folHlink>
+        <a:srgbClr val="954F72"/>
+      </a:folHlink>
+    </a:clrScheme>
+    <a:fontScheme name="Office">
+      <a:majorFont>
+        <a:latin typeface="Calibri Light" panose="020F0302020204030204"/>
+        <a:ea typeface=""/>
+        <a:cs typeface=""/>
+        <a:font script="Jpan" typeface="游ゴシック Light"/>
+        <a:font script="Hang" typeface="맑은 고딕"/>
+        <a:font script="Hans" typeface="等线 Light"/>
+        <a:font script="Hant" typeface="新細明體"/>
+        <a:font script="Arab" typeface="Times New Roman"/>
+        <a:font script="Hebr" typeface="Times New Roman"/>
+        <a:font script="Thai" typeface="Angsana New"/>
+        <a:font script="Ethi" typeface="Nyala"/>
+        <a:font script="Beng" typeface="Vrinda"/>
+        <a:font script="Gujr" typeface="Shruti"/>
+        <a:font script="Khmr" typeface="MoolBoran"/>
+        <a:font script="Knda" typeface="Tunga"/>
+        <a:font script="Guru" typeface="Raavi"/>
+        <a:font script="Cans" typeface="Euphemia"/>
+        <a:font script="Cher" typeface="Plantagenet Cherokee"/>
+        <a:font script="Yiii" typeface="Microsoft Yi Baiti"/>
+        <a:font script="Tibt" typeface="Microsoft Himalaya"/>
+        <a:font script="Thaa" typeface="MV Boli"/>
+        <a:font script="Deva" typeface="Mangal"/>
+        <a:font script="Telu" typeface="Gautami"/>
+        <a:font script="Taml" typeface="Latha"/>
+        <a:font script="Syrc" typeface="Estrangelo Edessa"/>
+        <a:font script="Orya" typeface="Kalinga"/>
+        <a:font script="Mlym" typeface="Kartika"/>
+        <a:font script="Laoo" typeface="DokChampa"/>
+        <a:font script="Sinh" typeface="Iskoola Pota"/>
+        <a:font script="Mong" typeface="Mongolian Baiti"/>
+        <a:font script="Viet" typeface="Times New Roman"/>
+        <a:font script="Uigh" typeface="Microsoft Uighur"/>
+        <a:font script="Geor" typeface="Sylfaen"/>
+        <a:font script="Armn" typeface="Arial"/>
+        <a:font script="Bugi" typeface="Leelawadee UI"/>
+        <a:font script="Bopo" typeface="Microsoft JhengHei"/>
+        <a:font script="Java" typeface="Javanese Text"/>
+        <a:font script="Lisu" typeface="Segoe UI"/>
+        <a:font script="Mymr" typeface="Myanmar Text"/>
+        <a:font script="Nkoo" typeface="Ebrima"/>
+        <a:font script="Olck" typeface="Nirmala UI"/>
+        <a:font script="Osma" typeface="Ebrima"/>
+        <a:font script="Phag" typeface="Phagspa"/>
+        <a:font script="Syrn" typeface="Estrangelo Edessa"/>
+        <a:font script="Syrj" typeface="Estrangelo Edessa"/>
+        <a:font script="Syre" typeface="Estrangelo Edessa"/>
+        <a:font script="Sora" typeface="Nirmala UI"/>
+        <a:font script="Tale" typeface="Microsoft Tai Le"/>
+        <a:font script="Talu" typeface="Microsoft New Tai Lue"/>
+        <a:font script="Tfng" typeface="Ebrima"/>
+      </a:majorFont>
+      <a:minorFont>
+        <a:latin typeface="Calibri" panose="020F0502020204030204"/>
+        <a:ea typeface=""/>
+        <a:cs typeface=""/>
+        <a:font script="Jpan" typeface="游ゴシック"/>
+        <a:font script="Hang" typeface="맑은 고딕"/>
+        <a:font script="Hans" typeface="等线"/>
+        <a:font script="Hant" typeface="新細明體"/>
+        <a:font script="Arab" typeface="Arial"/>
+        <a:font script="Hebr" typeface="Arial"/>
+        <a:font script="Thai" typeface="Cordia New"/>
+        <a:font script="Ethi" typeface="Nyala"/>
+        <a:font script="Beng" typeface="Vrinda"/>
+        <a:font script="Gujr" typeface="Shruti"/>
+        <a:font script="Khmr" typeface="DaunPenh"/>
+        <a:font script="Knda" typeface="Tunga"/>
+        <a:font script="Guru" typeface="Raavi"/>
+        <a:font script="Cans" typeface="Euphemia"/>
+        <a:font script="Cher" typeface="Plantagenet Cherokee"/>
+        <a:font script="Yiii" typeface="Microsoft Yi Baiti"/>
+        <a:font script="Tibt" typeface="Microsoft Himalaya"/>
+        <a:font script="Thaa" typeface="MV Boli"/>
+        <a:font script="Deva" typeface="Mangal"/>
+        <a:font script="Telu" typeface="Gautami"/>
+        <a:font script="Taml" typeface="Latha"/>
+        <a:font script="Syrc" typeface="Estrangelo Edessa"/>
+        <a:font script="Orya" typeface="Kalinga"/>
+        <a:font script="Mlym" typeface="Kartika"/>
+        <a:font script="Laoo" typeface="DokChampa"/>
+        <a:font script="Sinh" typeface="Iskoola Pota"/>
+        <a:font script="Mong" typeface="Mongolian Baiti"/>
+        <a:font script="Viet" typeface="Arial"/>
+        <a:font script="Uigh" typeface="Microsoft Uighur"/>
+        <a:font script="Geor" typeface="Sylfaen"/>
+        <a:font script="Armn" typeface="Arial"/>
+        <a:font script="Bugi" typeface="Leelawadee UI"/>
+        <a:font script="Bopo" typeface="Microsoft JhengHei"/>
+        <a:font script="Java" typeface="Javanese Text"/>
+        <a:font script="Lisu" typeface="Segoe UI"/>
+        <a:font script="Mymr" typeface="Myanmar Text"/>
+        <a:font script="Nkoo" typeface="Ebrima"/>
+        <a:font script="Olck" typeface="Nirmala UI"/>
+        <a:font script="Osma" typeface="Ebrima"/>
+        <a:font script="Phag" typeface="Phagspa"/>
+        <a:font script="Syrn" typeface="Estrangelo Edessa"/>
+        <a:font script="Syrj" typeface="Estrangelo Edessa"/>
+        <a:font script="Syre" typeface="Estrangelo Edessa"/>
+        <a:font script="Sora" typeface="Nirmala UI"/>
+        <a:font script="Tale" typeface="Microsoft Tai Le"/>
+        <a:font script="Talu" typeface="Microsoft New Tai Lue"/>
+        <a:font script="Tfng" typeface="Ebrima"/>
+      </a:minorFont>
+    </a:fontScheme>
+    <a:fmtScheme name="Office">
+      <a:fillStyleLst>
+        <a:solidFill>
+          <a:schemeClr val="phClr"/>
+        </a:solidFill>
+        <a:gradFill rotWithShape="1">
+          <a:gsLst>
+            <a:gs pos="0">
+              <a:schemeClr val="phClr">
+                <a:lumMod val="110000"/>
+                <a:satMod val="105000"/>
+                <a:tint val="67000"/>
+              </a:schemeClr>
+            </a:gs>
+            <a:gs pos="50000">
+              <a:schemeClr val="phClr">
+                <a:lumMod val="105000"/>
+                <a:satMod val="103000"/>
+                <a:tint val="73000"/>
+              </a:schemeClr>
+            </a:gs>
+            <a:gs pos="100000">
+              <a:schemeClr val="phClr">
+                <a:lumMod val="105000"/>
+                <a:satMod val="109000"/>
+                <a:tint val="81000"/>
+              </a:schemeClr>
+            </a:gs>
+          </a:gsLst>
+          <a:lin ang="5400000" scaled="0"/>
+        </a:gradFill>
+        <a:gradFill rotWithShape="1">
+          <a:gsLst>
+            <a:gs pos="0">
+              <a:schemeClr val="phClr">
+                <a:satMod val="103000"/>
+                <a:lumMod val="102000"/>
+                <a:tint val="94000"/>
+              </a:schemeClr>
+            </a:gs>
+            <a:gs pos="50000">
+              <a:schemeClr val="phClr">
+                <a:satMod val="110000"/>
+                <a:lumMod val="100000"/>
+                <a:shade val="100000"/>
+              </a:schemeClr>
+            </a:gs>
+            <a:gs pos="100000">
+              <a:schemeClr val="phClr">
+                <a:lumMod val="99000"/>
+                <a:satMod val="120000"/>
+                <a:shade val="78000"/>
+              </a:schemeClr>
+            </a:gs>
+          </a:gsLst>
+          <a:lin ang="5400000" scaled="0"/>
+        </a:gradFill>
+      </a:fillStyleLst>
+      <a:lnStyleLst>
+        <a:ln w="6350" cap="flat" cmpd="sng" algn="ctr">
+          <a:solidFill>
+            <a:schemeClr val="phClr"/>
+          </a:solidFill>
+          <a:prstDash val="solid"/>
+          <a:miter lim="800000"/>
+        </a:ln>
+        <a:ln w="12700" cap="flat" cmpd="sng" algn="ctr">
+          <a:solidFill>
+            <a:schemeClr val="phClr"/>
+          </a:solidFill>
+          <a:prstDash val="solid"/>
+          <a:miter lim="800000"/>
+        </a:ln>
+        <a:ln w="19050" cap="flat" cmpd="sng" algn="ctr">
+          <a:solidFill>
+            <a:schemeClr val="phClr"/>
+          </a:solidFill>
+          <a:prstDash val="solid"/>
+          <a:miter lim="800000"/>
+        </a:ln>
+      </a:lnStyleLst>
+      <a:effectStyleLst>
+        <a:effectStyle>
+          <a:effectLst/>
+        </a:effectStyle>
+        <a:effectStyle>
+          <a:effectLst/>
+        </a:effectStyle>
+        <a:effectStyle>
+          <a:effectLst>
+            <a:outerShdw blurRad="57150" dist="19050" dir="5400000" algn="ctr" rotWithShape="0">
+              <a:srgbClr val="000000">
+                <a:alpha val="63000"/>
+              </a:srgbClr>
+            </a:outerShdw>
+          </a:effectLst>
+        </a:effectStyle>
+      </a:effectStyleLst>
+      <a:bgFillStyleLst>
+        <a:solidFill>
+          <a:schemeClr val="phClr"/>
+        </a:solidFill>
+        <a:solidFill>
+          <a:schemeClr val="phClr">
+            <a:tint val="95000"/>
+            <a:satMod val="170000"/>
+          </a:schemeClr>
+        </a:solidFill>
+        <a:gradFill rotWithShape="1">
+          <a:gsLst>
+            <a:gs pos="0">
+              <a:schemeClr val="phClr">
+                <a:tint val="93000"/>
+                <a:satMod val="150000"/>
+                <a:shade val="98000"/>
+                <a:lumMod val="102000"/>
+              </a:schemeClr>
+            </a:gs>
+            <a:gs pos="50000">
+              <a:schemeClr val="phClr">
+                <a:tint val="98000"/>
+                <a:satMod val="130000"/>
+                <a:shade val="90000"/>
+                <a:lumMod val="103000"/>
+              </a:schemeClr>
+            </a:gs>
+            <a:gs pos="100000">
+              <a:schemeClr val="phClr">
+                <a:shade val="63000"/>
+                <a:satMod val="120000"/>
+              </a:schemeClr>
+            </a:gs>
+          </a:gsLst>
+          <a:lin ang="5400000" scaled="0"/>
+        </a:gradFill>
+      </a:bgFillStyleLst>
+    </a:fmtScheme>
+  </a:themeElements>
+  <a:objectDefaults/>
+  <a:extraClrSchemeLst/>
+  <a:extLst>
+    <a:ext uri="{05A4C25C-085E-4340-85A3-A5531E510DB2}">
+      <thm15:themeFamily xmlns:thm15="http://schemas.microsoft.com/office/thememl/2012/main" name="Office Theme" id="{62F939B6-93AF-4DB8-9C6B-D6C7DFDC589F}" vid="{4A3C46E8-61CC-4603-A589-7422A47A8E4A}"/>
+    </a:ext>
+  </a:extLst>
+</a:theme>
 </file>
</xml_diff>